<commit_message>
Inclus les changements d'Axelle
</commit_message>
<xml_diff>
--- a/Notes.pptx
+++ b/Notes.pptx
@@ -8,14 +8,15 @@
     <p:sldId id="265" r:id="rId2"/>
     <p:sldId id="256" r:id="rId3"/>
     <p:sldId id="257" r:id="rId4"/>
-    <p:sldId id="258" r:id="rId5"/>
-    <p:sldId id="259" r:id="rId6"/>
-    <p:sldId id="260" r:id="rId7"/>
-    <p:sldId id="261" r:id="rId8"/>
-    <p:sldId id="262" r:id="rId9"/>
-    <p:sldId id="263" r:id="rId10"/>
-    <p:sldId id="266" r:id="rId11"/>
-    <p:sldId id="264" r:id="rId12"/>
+    <p:sldId id="259" r:id="rId5"/>
+    <p:sldId id="260" r:id="rId6"/>
+    <p:sldId id="261" r:id="rId7"/>
+    <p:sldId id="262" r:id="rId8"/>
+    <p:sldId id="263" r:id="rId9"/>
+    <p:sldId id="266" r:id="rId10"/>
+    <p:sldId id="264" r:id="rId11"/>
+    <p:sldId id="267" r:id="rId12"/>
+    <p:sldId id="268" r:id="rId13"/>
   </p:sldIdLst>
   <p:sldSz cx="12192000" cy="6858000"/>
   <p:notesSz cx="6858000" cy="9144000"/>
@@ -269,7 +270,7 @@
           <a:p>
             <a:fld id="{BD1CE7B9-D124-4FB5-A5FC-D30B36F1B510}" type="datetimeFigureOut">
               <a:rPr lang="fr-FR" smtClean="0"/>
-              <a:t>10/02/2023</a:t>
+              <a:t>11/02/2023</a:t>
             </a:fld>
             <a:endParaRPr lang="fr-FR"/>
           </a:p>
@@ -467,7 +468,7 @@
           <a:p>
             <a:fld id="{BD1CE7B9-D124-4FB5-A5FC-D30B36F1B510}" type="datetimeFigureOut">
               <a:rPr lang="fr-FR" smtClean="0"/>
-              <a:t>10/02/2023</a:t>
+              <a:t>11/02/2023</a:t>
             </a:fld>
             <a:endParaRPr lang="fr-FR"/>
           </a:p>
@@ -675,7 +676,7 @@
           <a:p>
             <a:fld id="{BD1CE7B9-D124-4FB5-A5FC-D30B36F1B510}" type="datetimeFigureOut">
               <a:rPr lang="fr-FR" smtClean="0"/>
-              <a:t>10/02/2023</a:t>
+              <a:t>11/02/2023</a:t>
             </a:fld>
             <a:endParaRPr lang="fr-FR"/>
           </a:p>
@@ -873,7 +874,7 @@
           <a:p>
             <a:fld id="{BD1CE7B9-D124-4FB5-A5FC-D30B36F1B510}" type="datetimeFigureOut">
               <a:rPr lang="fr-FR" smtClean="0"/>
-              <a:t>10/02/2023</a:t>
+              <a:t>11/02/2023</a:t>
             </a:fld>
             <a:endParaRPr lang="fr-FR"/>
           </a:p>
@@ -1148,7 +1149,7 @@
           <a:p>
             <a:fld id="{BD1CE7B9-D124-4FB5-A5FC-D30B36F1B510}" type="datetimeFigureOut">
               <a:rPr lang="fr-FR" smtClean="0"/>
-              <a:t>10/02/2023</a:t>
+              <a:t>11/02/2023</a:t>
             </a:fld>
             <a:endParaRPr lang="fr-FR"/>
           </a:p>
@@ -1413,7 +1414,7 @@
           <a:p>
             <a:fld id="{BD1CE7B9-D124-4FB5-A5FC-D30B36F1B510}" type="datetimeFigureOut">
               <a:rPr lang="fr-FR" smtClean="0"/>
-              <a:t>10/02/2023</a:t>
+              <a:t>11/02/2023</a:t>
             </a:fld>
             <a:endParaRPr lang="fr-FR"/>
           </a:p>
@@ -1825,7 +1826,7 @@
           <a:p>
             <a:fld id="{BD1CE7B9-D124-4FB5-A5FC-D30B36F1B510}" type="datetimeFigureOut">
               <a:rPr lang="fr-FR" smtClean="0"/>
-              <a:t>10/02/2023</a:t>
+              <a:t>11/02/2023</a:t>
             </a:fld>
             <a:endParaRPr lang="fr-FR"/>
           </a:p>
@@ -1966,7 +1967,7 @@
           <a:p>
             <a:fld id="{BD1CE7B9-D124-4FB5-A5FC-D30B36F1B510}" type="datetimeFigureOut">
               <a:rPr lang="fr-FR" smtClean="0"/>
-              <a:t>10/02/2023</a:t>
+              <a:t>11/02/2023</a:t>
             </a:fld>
             <a:endParaRPr lang="fr-FR"/>
           </a:p>
@@ -2079,7 +2080,7 @@
           <a:p>
             <a:fld id="{BD1CE7B9-D124-4FB5-A5FC-D30B36F1B510}" type="datetimeFigureOut">
               <a:rPr lang="fr-FR" smtClean="0"/>
-              <a:t>10/02/2023</a:t>
+              <a:t>11/02/2023</a:t>
             </a:fld>
             <a:endParaRPr lang="fr-FR"/>
           </a:p>
@@ -2390,7 +2391,7 @@
           <a:p>
             <a:fld id="{BD1CE7B9-D124-4FB5-A5FC-D30B36F1B510}" type="datetimeFigureOut">
               <a:rPr lang="fr-FR" smtClean="0"/>
-              <a:t>10/02/2023</a:t>
+              <a:t>11/02/2023</a:t>
             </a:fld>
             <a:endParaRPr lang="fr-FR"/>
           </a:p>
@@ -2678,7 +2679,7 @@
           <a:p>
             <a:fld id="{BD1CE7B9-D124-4FB5-A5FC-D30B36F1B510}" type="datetimeFigureOut">
               <a:rPr lang="fr-FR" smtClean="0"/>
-              <a:t>10/02/2023</a:t>
+              <a:t>11/02/2023</a:t>
             </a:fld>
             <a:endParaRPr lang="fr-FR"/>
           </a:p>
@@ -2919,7 +2920,7 @@
           <a:p>
             <a:fld id="{BD1CE7B9-D124-4FB5-A5FC-D30B36F1B510}" type="datetimeFigureOut">
               <a:rPr lang="fr-FR" smtClean="0"/>
-              <a:t>10/02/2023</a:t>
+              <a:t>11/02/2023</a:t>
             </a:fld>
             <a:endParaRPr lang="fr-FR"/>
           </a:p>
@@ -3439,7 +3440,7 @@
           <p:cNvPr id="2" name="Titre 1">
             <a:extLst>
               <a:ext uri="{FF2B5EF4-FFF2-40B4-BE49-F238E27FC236}">
-                <a16:creationId xmlns:a16="http://schemas.microsoft.com/office/drawing/2014/main" id="{44BC1E36-AE13-32BC-18E6-EE70044697EF}"/>
+                <a16:creationId xmlns:a16="http://schemas.microsoft.com/office/drawing/2014/main" id="{A6FD9572-BD13-02F1-54A0-549DC2DD3AC0}"/>
               </a:ext>
             </a:extLst>
           </p:cNvPr>
@@ -3457,1017 +3458,44 @@
           <a:p>
             <a:r>
               <a:rPr lang="fr-FR" dirty="0" err="1"/>
-              <a:t>TinyGPSplus</a:t>
-            </a:r>
+              <a:t>Fritzing</a:t>
+            </a:r>
+            <a:endParaRPr lang="fr-FR" dirty="0"/>
+          </a:p>
+        </p:txBody>
+      </p:sp>
+      <p:sp>
+        <p:nvSpPr>
+          <p:cNvPr id="3" name="Espace réservé du contenu 2">
+            <a:extLst>
+              <a:ext uri="{FF2B5EF4-FFF2-40B4-BE49-F238E27FC236}">
+                <a16:creationId xmlns:a16="http://schemas.microsoft.com/office/drawing/2014/main" id="{F7236C77-F8F5-EF94-AB75-3DBF5DE0FA93}"/>
+              </a:ext>
+            </a:extLst>
+          </p:cNvPr>
+          <p:cNvSpPr>
+            <a:spLocks noGrp="1"/>
+          </p:cNvSpPr>
+          <p:nvPr>
+            <p:ph idx="1"/>
+          </p:nvPr>
+        </p:nvSpPr>
+        <p:spPr/>
+        <p:txBody>
+          <a:bodyPr/>
+          <a:lstStyle/>
+          <a:p>
             <a:r>
               <a:rPr lang="fr-FR" dirty="0"/>
-              <a:t>: Toutes les données </a:t>
-            </a:r>
-            <a:r>
-              <a:rPr lang="fr-FR" dirty="0" err="1"/>
-              <a:t>extractables</a:t>
-            </a:r>
-            <a:endParaRPr lang="fr-FR" dirty="0"/>
-          </a:p>
-        </p:txBody>
-      </p:sp>
-      <p:sp>
-        <p:nvSpPr>
-          <p:cNvPr id="3" name="Espace réservé du contenu 2">
-            <a:extLst>
-              <a:ext uri="{FF2B5EF4-FFF2-40B4-BE49-F238E27FC236}">
-                <a16:creationId xmlns:a16="http://schemas.microsoft.com/office/drawing/2014/main" id="{2F4F42FF-596B-550B-F70A-95ACA60245F5}"/>
-              </a:ext>
-            </a:extLst>
-          </p:cNvPr>
-          <p:cNvSpPr>
-            <a:spLocks noGrp="1"/>
-          </p:cNvSpPr>
-          <p:nvPr>
-            <p:ph idx="1"/>
-          </p:nvPr>
-        </p:nvSpPr>
-        <p:spPr>
-          <a:xfrm>
-            <a:off x="838200" y="1825625"/>
-            <a:ext cx="10515600" cy="4667250"/>
-          </a:xfrm>
-        </p:spPr>
-        <p:txBody>
-          <a:bodyPr>
-            <a:normAutofit fontScale="25000" lnSpcReduction="20000"/>
-          </a:bodyPr>
-          <a:lstStyle/>
-          <a:p>
-            <a:pPr marL="0" marR="0" lvl="0" indent="0" algn="l" defTabSz="914400" rtl="0" eaLnBrk="0" fontAlgn="base" latinLnBrk="0" hangingPunct="0">
-              <a:lnSpc>
-                <a:spcPct val="100000"/>
-              </a:lnSpc>
-              <a:spcBef>
-                <a:spcPct val="0"/>
-              </a:spcBef>
-              <a:spcAft>
-                <a:spcPct val="0"/>
-              </a:spcAft>
-              <a:buClrTx/>
-              <a:buSzTx/>
-              <a:buFontTx/>
-              <a:buNone/>
-              <a:tabLst/>
-            </a:pPr>
-            <a:r>
-              <a:rPr kumimoji="0" lang="fr-FR" altLang="fr-FR" sz="4800" b="0" i="0" u="none" strike="noStrike" cap="none" normalizeH="0" baseline="0" noProof="1">
-                <a:ln>
-                  <a:noFill/>
-                </a:ln>
-                <a:solidFill>
-                  <a:schemeClr val="tx1"/>
-                </a:solidFill>
-                <a:effectLst/>
-                <a:latin typeface="Consolas" panose="020B0609020204030204" pitchFamily="49" charset="0"/>
-              </a:rPr>
-              <a:t>Serial.println(gps.location.lat(), 6); // Latitude in degrees (double)</a:t>
-            </a:r>
-          </a:p>
-          <a:p>
-            <a:pPr marL="0" marR="0" lvl="0" indent="0" algn="l" defTabSz="914400" rtl="0" eaLnBrk="0" fontAlgn="base" latinLnBrk="0" hangingPunct="0">
-              <a:lnSpc>
-                <a:spcPct val="100000"/>
-              </a:lnSpc>
-              <a:spcBef>
-                <a:spcPct val="0"/>
-              </a:spcBef>
-              <a:spcAft>
-                <a:spcPct val="0"/>
-              </a:spcAft>
-              <a:buClrTx/>
-              <a:buSzTx/>
-              <a:buFontTx/>
-              <a:buNone/>
-              <a:tabLst/>
-            </a:pPr>
-            <a:r>
-              <a:rPr kumimoji="0" lang="fr-FR" altLang="fr-FR" sz="4800" b="0" i="0" u="none" strike="noStrike" cap="none" normalizeH="0" baseline="0" noProof="1">
-                <a:ln>
-                  <a:noFill/>
-                </a:ln>
-                <a:solidFill>
-                  <a:schemeClr val="tx1"/>
-                </a:solidFill>
-                <a:effectLst/>
-                <a:latin typeface="Consolas" panose="020B0609020204030204" pitchFamily="49" charset="0"/>
-              </a:rPr>
-              <a:t>Serial.println(gps.location.lng(), 6); // Longitude in degrees (double)</a:t>
-            </a:r>
-          </a:p>
-          <a:p>
-            <a:pPr marL="0" marR="0" lvl="0" indent="0" algn="l" defTabSz="914400" rtl="0" eaLnBrk="0" fontAlgn="base" latinLnBrk="0" hangingPunct="0">
-              <a:lnSpc>
-                <a:spcPct val="100000"/>
-              </a:lnSpc>
-              <a:spcBef>
-                <a:spcPct val="0"/>
-              </a:spcBef>
-              <a:spcAft>
-                <a:spcPct val="0"/>
-              </a:spcAft>
-              <a:buClrTx/>
-              <a:buSzTx/>
-              <a:buFontTx/>
-              <a:buNone/>
-              <a:tabLst/>
-            </a:pPr>
-            <a:r>
-              <a:rPr kumimoji="0" lang="fr-FR" altLang="fr-FR" sz="4800" b="0" i="0" u="none" strike="noStrike" cap="none" normalizeH="0" baseline="0" noProof="1">
-                <a:ln>
-                  <a:noFill/>
-                </a:ln>
-                <a:solidFill>
-                  <a:schemeClr val="tx1"/>
-                </a:solidFill>
-                <a:effectLst/>
-                <a:latin typeface="Consolas" panose="020B0609020204030204" pitchFamily="49" charset="0"/>
-              </a:rPr>
-              <a:t>Serial.print(gps.location.rawLat().negative ? "-" : "+");</a:t>
-            </a:r>
-          </a:p>
-          <a:p>
-            <a:pPr marL="0" marR="0" lvl="0" indent="0" algn="l" defTabSz="914400" rtl="0" eaLnBrk="0" fontAlgn="base" latinLnBrk="0" hangingPunct="0">
-              <a:lnSpc>
-                <a:spcPct val="100000"/>
-              </a:lnSpc>
-              <a:spcBef>
-                <a:spcPct val="0"/>
-              </a:spcBef>
-              <a:spcAft>
-                <a:spcPct val="0"/>
-              </a:spcAft>
-              <a:buClrTx/>
-              <a:buSzTx/>
-              <a:buFontTx/>
-              <a:buNone/>
-              <a:tabLst/>
-            </a:pPr>
-            <a:r>
-              <a:rPr kumimoji="0" lang="fr-FR" altLang="fr-FR" sz="4800" b="0" i="0" u="none" strike="noStrike" cap="none" normalizeH="0" baseline="0" noProof="1">
-                <a:ln>
-                  <a:noFill/>
-                </a:ln>
-                <a:solidFill>
-                  <a:schemeClr val="tx1"/>
-                </a:solidFill>
-                <a:effectLst/>
-                <a:latin typeface="Consolas" panose="020B0609020204030204" pitchFamily="49" charset="0"/>
-              </a:rPr>
-              <a:t>Serial.println(gps.location.rawLat().deg); // Raw latitude in whole degrees</a:t>
-            </a:r>
-          </a:p>
-          <a:p>
-            <a:pPr marL="0" marR="0" lvl="0" indent="0" algn="l" defTabSz="914400" rtl="0" eaLnBrk="0" fontAlgn="base" latinLnBrk="0" hangingPunct="0">
-              <a:lnSpc>
-                <a:spcPct val="100000"/>
-              </a:lnSpc>
-              <a:spcBef>
-                <a:spcPct val="0"/>
-              </a:spcBef>
-              <a:spcAft>
-                <a:spcPct val="0"/>
-              </a:spcAft>
-              <a:buClrTx/>
-              <a:buSzTx/>
-              <a:buFontTx/>
-              <a:buNone/>
-              <a:tabLst/>
-            </a:pPr>
-            <a:r>
-              <a:rPr kumimoji="0" lang="fr-FR" altLang="fr-FR" sz="4800" b="0" i="0" u="none" strike="noStrike" cap="none" normalizeH="0" baseline="0" noProof="1">
-                <a:ln>
-                  <a:noFill/>
-                </a:ln>
-                <a:solidFill>
-                  <a:schemeClr val="tx1"/>
-                </a:solidFill>
-                <a:effectLst/>
-                <a:latin typeface="Consolas" panose="020B0609020204030204" pitchFamily="49" charset="0"/>
-              </a:rPr>
-              <a:t>Serial.println(gps.location.rawLat().billionths);// ... and billionths (u16/u32)</a:t>
-            </a:r>
-          </a:p>
-          <a:p>
-            <a:pPr marL="0" marR="0" lvl="0" indent="0" algn="l" defTabSz="914400" rtl="0" eaLnBrk="0" fontAlgn="base" latinLnBrk="0" hangingPunct="0">
-              <a:lnSpc>
-                <a:spcPct val="100000"/>
-              </a:lnSpc>
-              <a:spcBef>
-                <a:spcPct val="0"/>
-              </a:spcBef>
-              <a:spcAft>
-                <a:spcPct val="0"/>
-              </a:spcAft>
-              <a:buClrTx/>
-              <a:buSzTx/>
-              <a:buFontTx/>
-              <a:buNone/>
-              <a:tabLst/>
-            </a:pPr>
-            <a:r>
-              <a:rPr kumimoji="0" lang="fr-FR" altLang="fr-FR" sz="4800" b="0" i="0" u="none" strike="noStrike" cap="none" normalizeH="0" baseline="0" noProof="1">
-                <a:ln>
-                  <a:noFill/>
-                </a:ln>
-                <a:solidFill>
-                  <a:schemeClr val="tx1"/>
-                </a:solidFill>
-                <a:effectLst/>
-                <a:latin typeface="Consolas" panose="020B0609020204030204" pitchFamily="49" charset="0"/>
-              </a:rPr>
-              <a:t>Serial.print(gps.location.rawLng().negative ? "-" : "+");</a:t>
-            </a:r>
-          </a:p>
-          <a:p>
-            <a:pPr marL="0" marR="0" lvl="0" indent="0" algn="l" defTabSz="914400" rtl="0" eaLnBrk="0" fontAlgn="base" latinLnBrk="0" hangingPunct="0">
-              <a:lnSpc>
-                <a:spcPct val="100000"/>
-              </a:lnSpc>
-              <a:spcBef>
-                <a:spcPct val="0"/>
-              </a:spcBef>
-              <a:spcAft>
-                <a:spcPct val="0"/>
-              </a:spcAft>
-              <a:buClrTx/>
-              <a:buSzTx/>
-              <a:buFontTx/>
-              <a:buNone/>
-              <a:tabLst/>
-            </a:pPr>
-            <a:r>
-              <a:rPr kumimoji="0" lang="fr-FR" altLang="fr-FR" sz="4800" b="0" i="0" u="none" strike="noStrike" cap="none" normalizeH="0" baseline="0" noProof="1">
-                <a:ln>
-                  <a:noFill/>
-                </a:ln>
-                <a:solidFill>
-                  <a:schemeClr val="tx1"/>
-                </a:solidFill>
-                <a:effectLst/>
-                <a:latin typeface="Consolas" panose="020B0609020204030204" pitchFamily="49" charset="0"/>
-              </a:rPr>
-              <a:t>Serial.println(gps.location.rawLng().deg); // Raw longitude in whole degrees</a:t>
-            </a:r>
-          </a:p>
-          <a:p>
-            <a:pPr marL="0" marR="0" lvl="0" indent="0" algn="l" defTabSz="914400" rtl="0" eaLnBrk="0" fontAlgn="base" latinLnBrk="0" hangingPunct="0">
-              <a:lnSpc>
-                <a:spcPct val="100000"/>
-              </a:lnSpc>
-              <a:spcBef>
-                <a:spcPct val="0"/>
-              </a:spcBef>
-              <a:spcAft>
-                <a:spcPct val="0"/>
-              </a:spcAft>
-              <a:buClrTx/>
-              <a:buSzTx/>
-              <a:buFontTx/>
-              <a:buNone/>
-              <a:tabLst/>
-            </a:pPr>
-            <a:r>
-              <a:rPr kumimoji="0" lang="fr-FR" altLang="fr-FR" sz="4800" b="0" i="0" u="none" strike="noStrike" cap="none" normalizeH="0" baseline="0" noProof="1">
-                <a:ln>
-                  <a:noFill/>
-                </a:ln>
-                <a:solidFill>
-                  <a:schemeClr val="tx1"/>
-                </a:solidFill>
-                <a:effectLst/>
-                <a:latin typeface="Consolas" panose="020B0609020204030204" pitchFamily="49" charset="0"/>
-              </a:rPr>
-              <a:t>Serial.println(gps.location.rawLng().billionths);// ... and billionths (u16/u32)</a:t>
-            </a:r>
-          </a:p>
-          <a:p>
-            <a:pPr marL="0" marR="0" lvl="0" indent="0" algn="l" defTabSz="914400" rtl="0" eaLnBrk="0" fontAlgn="base" latinLnBrk="0" hangingPunct="0">
-              <a:lnSpc>
-                <a:spcPct val="100000"/>
-              </a:lnSpc>
-              <a:spcBef>
-                <a:spcPct val="0"/>
-              </a:spcBef>
-              <a:spcAft>
-                <a:spcPct val="0"/>
-              </a:spcAft>
-              <a:buClrTx/>
-              <a:buSzTx/>
-              <a:buFontTx/>
-              <a:buNone/>
-              <a:tabLst/>
-            </a:pPr>
-            <a:r>
-              <a:rPr kumimoji="0" lang="fr-FR" altLang="fr-FR" sz="4800" b="0" i="0" u="none" strike="noStrike" cap="none" normalizeH="0" baseline="0" noProof="1">
-                <a:ln>
-                  <a:noFill/>
-                </a:ln>
-                <a:solidFill>
-                  <a:schemeClr val="tx1"/>
-                </a:solidFill>
-                <a:effectLst/>
-                <a:latin typeface="Consolas" panose="020B0609020204030204" pitchFamily="49" charset="0"/>
-              </a:rPr>
-              <a:t>Serial.println(gps.date.value()); // Raw date in DDMMYY format (u32)</a:t>
-            </a:r>
-          </a:p>
-          <a:p>
-            <a:pPr marL="0" marR="0" lvl="0" indent="0" algn="l" defTabSz="914400" rtl="0" eaLnBrk="0" fontAlgn="base" latinLnBrk="0" hangingPunct="0">
-              <a:lnSpc>
-                <a:spcPct val="100000"/>
-              </a:lnSpc>
-              <a:spcBef>
-                <a:spcPct val="0"/>
-              </a:spcBef>
-              <a:spcAft>
-                <a:spcPct val="0"/>
-              </a:spcAft>
-              <a:buClrTx/>
-              <a:buSzTx/>
-              <a:buFontTx/>
-              <a:buNone/>
-              <a:tabLst/>
-            </a:pPr>
-            <a:r>
-              <a:rPr kumimoji="0" lang="fr-FR" altLang="fr-FR" sz="4800" b="0" i="0" u="none" strike="noStrike" cap="none" normalizeH="0" baseline="0" noProof="1">
-                <a:ln>
-                  <a:noFill/>
-                </a:ln>
-                <a:solidFill>
-                  <a:schemeClr val="tx1"/>
-                </a:solidFill>
-                <a:effectLst/>
-                <a:latin typeface="Consolas" panose="020B0609020204030204" pitchFamily="49" charset="0"/>
-              </a:rPr>
-              <a:t>Serial.println(gps.date.year()); // Year (2000+) (u16)</a:t>
-            </a:r>
-          </a:p>
-          <a:p>
-            <a:pPr marL="0" marR="0" lvl="0" indent="0" algn="l" defTabSz="914400" rtl="0" eaLnBrk="0" fontAlgn="base" latinLnBrk="0" hangingPunct="0">
-              <a:lnSpc>
-                <a:spcPct val="100000"/>
-              </a:lnSpc>
-              <a:spcBef>
-                <a:spcPct val="0"/>
-              </a:spcBef>
-              <a:spcAft>
-                <a:spcPct val="0"/>
-              </a:spcAft>
-              <a:buClrTx/>
-              <a:buSzTx/>
-              <a:buFontTx/>
-              <a:buNone/>
-              <a:tabLst/>
-            </a:pPr>
-            <a:r>
-              <a:rPr kumimoji="0" lang="fr-FR" altLang="fr-FR" sz="4800" b="0" i="0" u="none" strike="noStrike" cap="none" normalizeH="0" baseline="0" noProof="1">
-                <a:ln>
-                  <a:noFill/>
-                </a:ln>
-                <a:solidFill>
-                  <a:schemeClr val="tx1"/>
-                </a:solidFill>
-                <a:effectLst/>
-                <a:latin typeface="Consolas" panose="020B0609020204030204" pitchFamily="49" charset="0"/>
-              </a:rPr>
-              <a:t>Serial.println(gps.date.month()); // Month (1-12) (u8)</a:t>
-            </a:r>
-          </a:p>
-          <a:p>
-            <a:pPr marL="0" marR="0" lvl="0" indent="0" algn="l" defTabSz="914400" rtl="0" eaLnBrk="0" fontAlgn="base" latinLnBrk="0" hangingPunct="0">
-              <a:lnSpc>
-                <a:spcPct val="100000"/>
-              </a:lnSpc>
-              <a:spcBef>
-                <a:spcPct val="0"/>
-              </a:spcBef>
-              <a:spcAft>
-                <a:spcPct val="0"/>
-              </a:spcAft>
-              <a:buClrTx/>
-              <a:buSzTx/>
-              <a:buFontTx/>
-              <a:buNone/>
-              <a:tabLst/>
-            </a:pPr>
-            <a:r>
-              <a:rPr kumimoji="0" lang="fr-FR" altLang="fr-FR" sz="4800" b="0" i="0" u="none" strike="noStrike" cap="none" normalizeH="0" baseline="0" noProof="1">
-                <a:ln>
-                  <a:noFill/>
-                </a:ln>
-                <a:solidFill>
-                  <a:schemeClr val="tx1"/>
-                </a:solidFill>
-                <a:effectLst/>
-                <a:latin typeface="Consolas" panose="020B0609020204030204" pitchFamily="49" charset="0"/>
-              </a:rPr>
-              <a:t>Serial.println(gps.date.day()); // Day (1-31) (u8)</a:t>
-            </a:r>
-          </a:p>
-          <a:p>
-            <a:pPr marL="0" marR="0" lvl="0" indent="0" algn="l" defTabSz="914400" rtl="0" eaLnBrk="0" fontAlgn="base" latinLnBrk="0" hangingPunct="0">
-              <a:lnSpc>
-                <a:spcPct val="100000"/>
-              </a:lnSpc>
-              <a:spcBef>
-                <a:spcPct val="0"/>
-              </a:spcBef>
-              <a:spcAft>
-                <a:spcPct val="0"/>
-              </a:spcAft>
-              <a:buClrTx/>
-              <a:buSzTx/>
-              <a:buFontTx/>
-              <a:buNone/>
-              <a:tabLst/>
-            </a:pPr>
-            <a:r>
-              <a:rPr kumimoji="0" lang="fr-FR" altLang="fr-FR" sz="4800" b="0" i="0" u="none" strike="noStrike" cap="none" normalizeH="0" baseline="0" noProof="1">
-                <a:ln>
-                  <a:noFill/>
-                </a:ln>
-                <a:solidFill>
-                  <a:schemeClr val="tx1"/>
-                </a:solidFill>
-                <a:effectLst/>
-                <a:latin typeface="Consolas" panose="020B0609020204030204" pitchFamily="49" charset="0"/>
-              </a:rPr>
-              <a:t>Serial.println(gps.time.value()); // Raw time in HHMMSSCC format (u32)</a:t>
-            </a:r>
-          </a:p>
-          <a:p>
-            <a:pPr marL="0" marR="0" lvl="0" indent="0" algn="l" defTabSz="914400" rtl="0" eaLnBrk="0" fontAlgn="base" latinLnBrk="0" hangingPunct="0">
-              <a:lnSpc>
-                <a:spcPct val="100000"/>
-              </a:lnSpc>
-              <a:spcBef>
-                <a:spcPct val="0"/>
-              </a:spcBef>
-              <a:spcAft>
-                <a:spcPct val="0"/>
-              </a:spcAft>
-              <a:buClrTx/>
-              <a:buSzTx/>
-              <a:buFontTx/>
-              <a:buNone/>
-              <a:tabLst/>
-            </a:pPr>
-            <a:r>
-              <a:rPr kumimoji="0" lang="fr-FR" altLang="fr-FR" sz="4800" b="0" i="0" u="none" strike="noStrike" cap="none" normalizeH="0" baseline="0" noProof="1">
-                <a:ln>
-                  <a:noFill/>
-                </a:ln>
-                <a:solidFill>
-                  <a:schemeClr val="tx1"/>
-                </a:solidFill>
-                <a:effectLst/>
-                <a:latin typeface="Consolas" panose="020B0609020204030204" pitchFamily="49" charset="0"/>
-              </a:rPr>
-              <a:t>Serial.println(gps.time.hour()); // Hour (0-23) (u8)</a:t>
-            </a:r>
-          </a:p>
-          <a:p>
-            <a:pPr marL="0" marR="0" lvl="0" indent="0" algn="l" defTabSz="914400" rtl="0" eaLnBrk="0" fontAlgn="base" latinLnBrk="0" hangingPunct="0">
-              <a:lnSpc>
-                <a:spcPct val="100000"/>
-              </a:lnSpc>
-              <a:spcBef>
-                <a:spcPct val="0"/>
-              </a:spcBef>
-              <a:spcAft>
-                <a:spcPct val="0"/>
-              </a:spcAft>
-              <a:buClrTx/>
-              <a:buSzTx/>
-              <a:buFontTx/>
-              <a:buNone/>
-              <a:tabLst/>
-            </a:pPr>
-            <a:r>
-              <a:rPr kumimoji="0" lang="fr-FR" altLang="fr-FR" sz="4800" b="0" i="0" u="none" strike="noStrike" cap="none" normalizeH="0" baseline="0" noProof="1">
-                <a:ln>
-                  <a:noFill/>
-                </a:ln>
-                <a:solidFill>
-                  <a:schemeClr val="tx1"/>
-                </a:solidFill>
-                <a:effectLst/>
-                <a:latin typeface="Consolas" panose="020B0609020204030204" pitchFamily="49" charset="0"/>
-              </a:rPr>
-              <a:t>Serial.println(gps.time.minute()); // Minute (0-59) (u8)</a:t>
-            </a:r>
-          </a:p>
-          <a:p>
-            <a:pPr marL="0" marR="0" lvl="0" indent="0" algn="l" defTabSz="914400" rtl="0" eaLnBrk="0" fontAlgn="base" latinLnBrk="0" hangingPunct="0">
-              <a:lnSpc>
-                <a:spcPct val="100000"/>
-              </a:lnSpc>
-              <a:spcBef>
-                <a:spcPct val="0"/>
-              </a:spcBef>
-              <a:spcAft>
-                <a:spcPct val="0"/>
-              </a:spcAft>
-              <a:buClrTx/>
-              <a:buSzTx/>
-              <a:buFontTx/>
-              <a:buNone/>
-              <a:tabLst/>
-            </a:pPr>
-            <a:r>
-              <a:rPr kumimoji="0" lang="fr-FR" altLang="fr-FR" sz="4800" b="0" i="0" u="none" strike="noStrike" cap="none" normalizeH="0" baseline="0" noProof="1">
-                <a:ln>
-                  <a:noFill/>
-                </a:ln>
-                <a:solidFill>
-                  <a:schemeClr val="tx1"/>
-                </a:solidFill>
-                <a:effectLst/>
-                <a:latin typeface="Consolas" panose="020B0609020204030204" pitchFamily="49" charset="0"/>
-              </a:rPr>
-              <a:t>Serial.println(gps.time.second()); // Second (0-59) (u8)</a:t>
-            </a:r>
-          </a:p>
-          <a:p>
-            <a:pPr marL="0" marR="0" lvl="0" indent="0" algn="l" defTabSz="914400" rtl="0" eaLnBrk="0" fontAlgn="base" latinLnBrk="0" hangingPunct="0">
-              <a:lnSpc>
-                <a:spcPct val="100000"/>
-              </a:lnSpc>
-              <a:spcBef>
-                <a:spcPct val="0"/>
-              </a:spcBef>
-              <a:spcAft>
-                <a:spcPct val="0"/>
-              </a:spcAft>
-              <a:buClrTx/>
-              <a:buSzTx/>
-              <a:buFontTx/>
-              <a:buNone/>
-              <a:tabLst/>
-            </a:pPr>
-            <a:r>
-              <a:rPr kumimoji="0" lang="fr-FR" altLang="fr-FR" sz="4800" b="0" i="0" u="none" strike="noStrike" cap="none" normalizeH="0" baseline="0" noProof="1">
-                <a:ln>
-                  <a:noFill/>
-                </a:ln>
-                <a:solidFill>
-                  <a:schemeClr val="tx1"/>
-                </a:solidFill>
-                <a:effectLst/>
-                <a:latin typeface="Consolas" panose="020B0609020204030204" pitchFamily="49" charset="0"/>
-              </a:rPr>
-              <a:t>Serial.println(gps.time.centisecond()); // 100ths of a second (0-99) (u8)</a:t>
-            </a:r>
-          </a:p>
-          <a:p>
-            <a:pPr marL="0" marR="0" lvl="0" indent="0" algn="l" defTabSz="914400" rtl="0" eaLnBrk="0" fontAlgn="base" latinLnBrk="0" hangingPunct="0">
-              <a:lnSpc>
-                <a:spcPct val="100000"/>
-              </a:lnSpc>
-              <a:spcBef>
-                <a:spcPct val="0"/>
-              </a:spcBef>
-              <a:spcAft>
-                <a:spcPct val="0"/>
-              </a:spcAft>
-              <a:buClrTx/>
-              <a:buSzTx/>
-              <a:buFontTx/>
-              <a:buNone/>
-              <a:tabLst/>
-            </a:pPr>
-            <a:r>
-              <a:rPr kumimoji="0" lang="fr-FR" altLang="fr-FR" sz="4800" b="0" i="0" u="none" strike="noStrike" cap="none" normalizeH="0" baseline="0" noProof="1">
-                <a:ln>
-                  <a:noFill/>
-                </a:ln>
-                <a:solidFill>
-                  <a:schemeClr val="tx1"/>
-                </a:solidFill>
-                <a:effectLst/>
-                <a:latin typeface="Consolas" panose="020B0609020204030204" pitchFamily="49" charset="0"/>
-              </a:rPr>
-              <a:t>Serial.println(gps.speed.value()); // Raw speed in 100ths of a knot (i32)</a:t>
-            </a:r>
-          </a:p>
-          <a:p>
-            <a:pPr marL="0" marR="0" lvl="0" indent="0" algn="l" defTabSz="914400" rtl="0" eaLnBrk="0" fontAlgn="base" latinLnBrk="0" hangingPunct="0">
-              <a:lnSpc>
-                <a:spcPct val="100000"/>
-              </a:lnSpc>
-              <a:spcBef>
-                <a:spcPct val="0"/>
-              </a:spcBef>
-              <a:spcAft>
-                <a:spcPct val="0"/>
-              </a:spcAft>
-              <a:buClrTx/>
-              <a:buSzTx/>
-              <a:buFontTx/>
-              <a:buNone/>
-              <a:tabLst/>
-            </a:pPr>
-            <a:r>
-              <a:rPr kumimoji="0" lang="fr-FR" altLang="fr-FR" sz="4800" b="0" i="0" u="none" strike="noStrike" cap="none" normalizeH="0" baseline="0" noProof="1">
-                <a:ln>
-                  <a:noFill/>
-                </a:ln>
-                <a:solidFill>
-                  <a:schemeClr val="tx1"/>
-                </a:solidFill>
-                <a:effectLst/>
-                <a:latin typeface="Consolas" panose="020B0609020204030204" pitchFamily="49" charset="0"/>
-              </a:rPr>
-              <a:t>Serial.println(gps.speed.knots()); // Speed in knots (double)</a:t>
-            </a:r>
-          </a:p>
-          <a:p>
-            <a:pPr marL="0" marR="0" lvl="0" indent="0" algn="l" defTabSz="914400" rtl="0" eaLnBrk="0" fontAlgn="base" latinLnBrk="0" hangingPunct="0">
-              <a:lnSpc>
-                <a:spcPct val="100000"/>
-              </a:lnSpc>
-              <a:spcBef>
-                <a:spcPct val="0"/>
-              </a:spcBef>
-              <a:spcAft>
-                <a:spcPct val="0"/>
-              </a:spcAft>
-              <a:buClrTx/>
-              <a:buSzTx/>
-              <a:buFontTx/>
-              <a:buNone/>
-              <a:tabLst/>
-            </a:pPr>
-            <a:r>
-              <a:rPr kumimoji="0" lang="fr-FR" altLang="fr-FR" sz="4800" b="0" i="0" u="none" strike="noStrike" cap="none" normalizeH="0" baseline="0" noProof="1">
-                <a:ln>
-                  <a:noFill/>
-                </a:ln>
-                <a:solidFill>
-                  <a:schemeClr val="tx1"/>
-                </a:solidFill>
-                <a:effectLst/>
-                <a:latin typeface="Consolas" panose="020B0609020204030204" pitchFamily="49" charset="0"/>
-              </a:rPr>
-              <a:t>Serial.println(gps.speed.mph()); // Speed in miles per hour (double)</a:t>
-            </a:r>
-          </a:p>
-          <a:p>
-            <a:pPr marL="0" marR="0" lvl="0" indent="0" algn="l" defTabSz="914400" rtl="0" eaLnBrk="0" fontAlgn="base" latinLnBrk="0" hangingPunct="0">
-              <a:lnSpc>
-                <a:spcPct val="100000"/>
-              </a:lnSpc>
-              <a:spcBef>
-                <a:spcPct val="0"/>
-              </a:spcBef>
-              <a:spcAft>
-                <a:spcPct val="0"/>
-              </a:spcAft>
-              <a:buClrTx/>
-              <a:buSzTx/>
-              <a:buFontTx/>
-              <a:buNone/>
-              <a:tabLst/>
-            </a:pPr>
-            <a:r>
-              <a:rPr kumimoji="0" lang="fr-FR" altLang="fr-FR" sz="4800" b="0" i="0" u="none" strike="noStrike" cap="none" normalizeH="0" baseline="0" noProof="1">
-                <a:ln>
-                  <a:noFill/>
-                </a:ln>
-                <a:solidFill>
-                  <a:schemeClr val="tx1"/>
-                </a:solidFill>
-                <a:effectLst/>
-                <a:latin typeface="Consolas" panose="020B0609020204030204" pitchFamily="49" charset="0"/>
-              </a:rPr>
-              <a:t>Serial.println(gps.speed.mps()); // Speed in meters per second (double)</a:t>
-            </a:r>
-          </a:p>
-          <a:p>
-            <a:pPr marL="0" marR="0" lvl="0" indent="0" algn="l" defTabSz="914400" rtl="0" eaLnBrk="0" fontAlgn="base" latinLnBrk="0" hangingPunct="0">
-              <a:lnSpc>
-                <a:spcPct val="100000"/>
-              </a:lnSpc>
-              <a:spcBef>
-                <a:spcPct val="0"/>
-              </a:spcBef>
-              <a:spcAft>
-                <a:spcPct val="0"/>
-              </a:spcAft>
-              <a:buClrTx/>
-              <a:buSzTx/>
-              <a:buFontTx/>
-              <a:buNone/>
-              <a:tabLst/>
-            </a:pPr>
-            <a:r>
-              <a:rPr kumimoji="0" lang="fr-FR" altLang="fr-FR" sz="4800" b="0" i="0" u="none" strike="noStrike" cap="none" normalizeH="0" baseline="0" noProof="1">
-                <a:ln>
-                  <a:noFill/>
-                </a:ln>
-                <a:solidFill>
-                  <a:schemeClr val="tx1"/>
-                </a:solidFill>
-                <a:effectLst/>
-                <a:latin typeface="Consolas" panose="020B0609020204030204" pitchFamily="49" charset="0"/>
-              </a:rPr>
-              <a:t>Serial.println(gps.speed.kmph()); // Speed in kilometers per hour (double)</a:t>
-            </a:r>
-          </a:p>
-          <a:p>
-            <a:pPr marL="0" marR="0" lvl="0" indent="0" algn="l" defTabSz="914400" rtl="0" eaLnBrk="0" fontAlgn="base" latinLnBrk="0" hangingPunct="0">
-              <a:lnSpc>
-                <a:spcPct val="100000"/>
-              </a:lnSpc>
-              <a:spcBef>
-                <a:spcPct val="0"/>
-              </a:spcBef>
-              <a:spcAft>
-                <a:spcPct val="0"/>
-              </a:spcAft>
-              <a:buClrTx/>
-              <a:buSzTx/>
-              <a:buFontTx/>
-              <a:buNone/>
-              <a:tabLst/>
-            </a:pPr>
-            <a:r>
-              <a:rPr kumimoji="0" lang="fr-FR" altLang="fr-FR" sz="4800" b="0" i="0" u="none" strike="noStrike" cap="none" normalizeH="0" baseline="0" noProof="1">
-                <a:ln>
-                  <a:noFill/>
-                </a:ln>
-                <a:solidFill>
-                  <a:schemeClr val="tx1"/>
-                </a:solidFill>
-                <a:effectLst/>
-                <a:latin typeface="Consolas" panose="020B0609020204030204" pitchFamily="49" charset="0"/>
-              </a:rPr>
-              <a:t>Serial.println(gps.course.value()); // Raw course in 100ths of a degree (i32)</a:t>
-            </a:r>
-          </a:p>
-          <a:p>
-            <a:pPr marL="0" marR="0" lvl="0" indent="0" algn="l" defTabSz="914400" rtl="0" eaLnBrk="0" fontAlgn="base" latinLnBrk="0" hangingPunct="0">
-              <a:lnSpc>
-                <a:spcPct val="100000"/>
-              </a:lnSpc>
-              <a:spcBef>
-                <a:spcPct val="0"/>
-              </a:spcBef>
-              <a:spcAft>
-                <a:spcPct val="0"/>
-              </a:spcAft>
-              <a:buClrTx/>
-              <a:buSzTx/>
-              <a:buFontTx/>
-              <a:buNone/>
-              <a:tabLst/>
-            </a:pPr>
-            <a:r>
-              <a:rPr kumimoji="0" lang="fr-FR" altLang="fr-FR" sz="4800" b="0" i="0" u="none" strike="noStrike" cap="none" normalizeH="0" baseline="0" noProof="1">
-                <a:ln>
-                  <a:noFill/>
-                </a:ln>
-                <a:solidFill>
-                  <a:schemeClr val="tx1"/>
-                </a:solidFill>
-                <a:effectLst/>
-                <a:latin typeface="Consolas" panose="020B0609020204030204" pitchFamily="49" charset="0"/>
-              </a:rPr>
-              <a:t>Serial.println(gps.course.deg()); // Course in degrees (double)</a:t>
-            </a:r>
-          </a:p>
-          <a:p>
-            <a:pPr marL="0" marR="0" lvl="0" indent="0" algn="l" defTabSz="914400" rtl="0" eaLnBrk="0" fontAlgn="base" latinLnBrk="0" hangingPunct="0">
-              <a:lnSpc>
-                <a:spcPct val="100000"/>
-              </a:lnSpc>
-              <a:spcBef>
-                <a:spcPct val="0"/>
-              </a:spcBef>
-              <a:spcAft>
-                <a:spcPct val="0"/>
-              </a:spcAft>
-              <a:buClrTx/>
-              <a:buSzTx/>
-              <a:buFontTx/>
-              <a:buNone/>
-              <a:tabLst/>
-            </a:pPr>
-            <a:r>
-              <a:rPr kumimoji="0" lang="fr-FR" altLang="fr-FR" sz="4800" b="0" i="0" u="none" strike="noStrike" cap="none" normalizeH="0" baseline="0" noProof="1">
-                <a:ln>
-                  <a:noFill/>
-                </a:ln>
-                <a:solidFill>
-                  <a:schemeClr val="tx1"/>
-                </a:solidFill>
-                <a:effectLst/>
-                <a:latin typeface="Consolas" panose="020B0609020204030204" pitchFamily="49" charset="0"/>
-              </a:rPr>
-              <a:t>Serial.println(gps.altitude.value()); // Raw altitude in centimeters (i32)</a:t>
-            </a:r>
-          </a:p>
-          <a:p>
-            <a:pPr marL="0" marR="0" lvl="0" indent="0" algn="l" defTabSz="914400" rtl="0" eaLnBrk="0" fontAlgn="base" latinLnBrk="0" hangingPunct="0">
-              <a:lnSpc>
-                <a:spcPct val="100000"/>
-              </a:lnSpc>
-              <a:spcBef>
-                <a:spcPct val="0"/>
-              </a:spcBef>
-              <a:spcAft>
-                <a:spcPct val="0"/>
-              </a:spcAft>
-              <a:buClrTx/>
-              <a:buSzTx/>
-              <a:buFontTx/>
-              <a:buNone/>
-              <a:tabLst/>
-            </a:pPr>
-            <a:r>
-              <a:rPr kumimoji="0" lang="fr-FR" altLang="fr-FR" sz="4800" b="0" i="0" u="none" strike="noStrike" cap="none" normalizeH="0" baseline="0" noProof="1">
-                <a:ln>
-                  <a:noFill/>
-                </a:ln>
-                <a:solidFill>
-                  <a:schemeClr val="tx1"/>
-                </a:solidFill>
-                <a:effectLst/>
-                <a:latin typeface="Consolas" panose="020B0609020204030204" pitchFamily="49" charset="0"/>
-              </a:rPr>
-              <a:t>Serial.println(gps.altitude.meters()); // Altitude in meters (double)</a:t>
-            </a:r>
-          </a:p>
-          <a:p>
-            <a:pPr marL="0" marR="0" lvl="0" indent="0" algn="l" defTabSz="914400" rtl="0" eaLnBrk="0" fontAlgn="base" latinLnBrk="0" hangingPunct="0">
-              <a:lnSpc>
-                <a:spcPct val="100000"/>
-              </a:lnSpc>
-              <a:spcBef>
-                <a:spcPct val="0"/>
-              </a:spcBef>
-              <a:spcAft>
-                <a:spcPct val="0"/>
-              </a:spcAft>
-              <a:buClrTx/>
-              <a:buSzTx/>
-              <a:buFontTx/>
-              <a:buNone/>
-              <a:tabLst/>
-            </a:pPr>
-            <a:r>
-              <a:rPr kumimoji="0" lang="fr-FR" altLang="fr-FR" sz="4800" b="0" i="0" u="none" strike="noStrike" cap="none" normalizeH="0" baseline="0" noProof="1">
-                <a:ln>
-                  <a:noFill/>
-                </a:ln>
-                <a:solidFill>
-                  <a:schemeClr val="tx1"/>
-                </a:solidFill>
-                <a:effectLst/>
-                <a:latin typeface="Consolas" panose="020B0609020204030204" pitchFamily="49" charset="0"/>
-              </a:rPr>
-              <a:t>Serial.println(gps.altitude.miles()); // Altitude in miles (double)</a:t>
-            </a:r>
-          </a:p>
-          <a:p>
-            <a:pPr marL="0" marR="0" lvl="0" indent="0" algn="l" defTabSz="914400" rtl="0" eaLnBrk="0" fontAlgn="base" latinLnBrk="0" hangingPunct="0">
-              <a:lnSpc>
-                <a:spcPct val="100000"/>
-              </a:lnSpc>
-              <a:spcBef>
-                <a:spcPct val="0"/>
-              </a:spcBef>
-              <a:spcAft>
-                <a:spcPct val="0"/>
-              </a:spcAft>
-              <a:buClrTx/>
-              <a:buSzTx/>
-              <a:buFontTx/>
-              <a:buNone/>
-              <a:tabLst/>
-            </a:pPr>
-            <a:r>
-              <a:rPr kumimoji="0" lang="fr-FR" altLang="fr-FR" sz="4800" b="0" i="0" u="none" strike="noStrike" cap="none" normalizeH="0" baseline="0" noProof="1">
-                <a:ln>
-                  <a:noFill/>
-                </a:ln>
-                <a:solidFill>
-                  <a:schemeClr val="tx1"/>
-                </a:solidFill>
-                <a:effectLst/>
-                <a:latin typeface="Consolas" panose="020B0609020204030204" pitchFamily="49" charset="0"/>
-              </a:rPr>
-              <a:t>Serial.println(gps.altitude.kilometers()); // Altitude in kilometers (double)</a:t>
-            </a:r>
-          </a:p>
-          <a:p>
-            <a:pPr marL="0" marR="0" lvl="0" indent="0" algn="l" defTabSz="914400" rtl="0" eaLnBrk="0" fontAlgn="base" latinLnBrk="0" hangingPunct="0">
-              <a:lnSpc>
-                <a:spcPct val="100000"/>
-              </a:lnSpc>
-              <a:spcBef>
-                <a:spcPct val="0"/>
-              </a:spcBef>
-              <a:spcAft>
-                <a:spcPct val="0"/>
-              </a:spcAft>
-              <a:buClrTx/>
-              <a:buSzTx/>
-              <a:buFontTx/>
-              <a:buNone/>
-              <a:tabLst/>
-            </a:pPr>
-            <a:r>
-              <a:rPr kumimoji="0" lang="fr-FR" altLang="fr-FR" sz="4800" b="0" i="0" u="none" strike="noStrike" cap="none" normalizeH="0" baseline="0" noProof="1">
-                <a:ln>
-                  <a:noFill/>
-                </a:ln>
-                <a:solidFill>
-                  <a:schemeClr val="tx1"/>
-                </a:solidFill>
-                <a:effectLst/>
-                <a:latin typeface="Consolas" panose="020B0609020204030204" pitchFamily="49" charset="0"/>
-              </a:rPr>
-              <a:t>Serial.println(gps.altitude.feet()); // Altitude in feet (double)</a:t>
-            </a:r>
-          </a:p>
-          <a:p>
-            <a:pPr marL="0" marR="0" lvl="0" indent="0" algn="l" defTabSz="914400" rtl="0" eaLnBrk="0" fontAlgn="base" latinLnBrk="0" hangingPunct="0">
-              <a:lnSpc>
-                <a:spcPct val="100000"/>
-              </a:lnSpc>
-              <a:spcBef>
-                <a:spcPct val="0"/>
-              </a:spcBef>
-              <a:spcAft>
-                <a:spcPct val="0"/>
-              </a:spcAft>
-              <a:buClrTx/>
-              <a:buSzTx/>
-              <a:buFontTx/>
-              <a:buNone/>
-              <a:tabLst/>
-            </a:pPr>
-            <a:r>
-              <a:rPr kumimoji="0" lang="fr-FR" altLang="fr-FR" sz="4800" b="0" i="0" u="none" strike="noStrike" cap="none" normalizeH="0" baseline="0" noProof="1">
-                <a:ln>
-                  <a:noFill/>
-                </a:ln>
-                <a:solidFill>
-                  <a:schemeClr val="tx1"/>
-                </a:solidFill>
-                <a:effectLst/>
-                <a:latin typeface="Consolas" panose="020B0609020204030204" pitchFamily="49" charset="0"/>
-              </a:rPr>
-              <a:t>Serial.println(gps.satellites.value()); // Number of satellites in use (u32)</a:t>
-            </a:r>
-          </a:p>
-          <a:p>
-            <a:pPr marL="0" marR="0" lvl="0" indent="0" algn="l" defTabSz="914400" rtl="0" eaLnBrk="0" fontAlgn="base" latinLnBrk="0" hangingPunct="0">
-              <a:lnSpc>
-                <a:spcPct val="100000"/>
-              </a:lnSpc>
-              <a:spcBef>
-                <a:spcPct val="0"/>
-              </a:spcBef>
-              <a:spcAft>
-                <a:spcPct val="0"/>
-              </a:spcAft>
-              <a:buClrTx/>
-              <a:buSzTx/>
-              <a:buFontTx/>
-              <a:buNone/>
-              <a:tabLst/>
-            </a:pPr>
-            <a:r>
-              <a:rPr kumimoji="0" lang="fr-FR" altLang="fr-FR" sz="4800" b="0" i="0" u="none" strike="noStrike" cap="none" normalizeH="0" baseline="0" noProof="1">
-                <a:ln>
-                  <a:noFill/>
-                </a:ln>
-                <a:solidFill>
-                  <a:schemeClr val="tx1"/>
-                </a:solidFill>
-                <a:effectLst/>
-                <a:latin typeface="Consolas" panose="020B0609020204030204" pitchFamily="49" charset="0"/>
-              </a:rPr>
-              <a:t>Serial.println(gps.hdop.value()); // Horizontal Dim. of Precision (100ths-i32)</a:t>
-            </a:r>
-          </a:p>
-          <a:p>
-            <a:endParaRPr lang="fr-FR" noProof="1"/>
+              <a:t>Pour faire les schémas électrique</a:t>
+            </a:r>
           </a:p>
         </p:txBody>
       </p:sp>
     </p:spTree>
     <p:extLst>
       <p:ext uri="{BB962C8B-B14F-4D97-AF65-F5344CB8AC3E}">
-        <p14:creationId xmlns:p14="http://schemas.microsoft.com/office/powerpoint/2010/main" val="3313896012"/>
+        <p14:creationId xmlns:p14="http://schemas.microsoft.com/office/powerpoint/2010/main" val="1010827793"/>
       </p:ext>
     </p:extLst>
   </p:cSld>
@@ -4499,7 +3527,7 @@
           <p:cNvPr id="2" name="Titre 1">
             <a:extLst>
               <a:ext uri="{FF2B5EF4-FFF2-40B4-BE49-F238E27FC236}">
-                <a16:creationId xmlns:a16="http://schemas.microsoft.com/office/drawing/2014/main" id="{A6FD9572-BD13-02F1-54A0-549DC2DD3AC0}"/>
+                <a16:creationId xmlns:a16="http://schemas.microsoft.com/office/drawing/2014/main" id="{E32AECBB-453E-BFA3-70C8-4EBC90E59AF5}"/>
               </a:ext>
             </a:extLst>
           </p:cNvPr>
@@ -4516,45 +3544,221 @@
           <a:lstStyle/>
           <a:p>
             <a:r>
-              <a:rPr lang="fr-FR" dirty="0" err="1"/>
-              <a:t>Fritzing</a:t>
-            </a:r>
-            <a:endParaRPr lang="fr-FR" dirty="0"/>
-          </a:p>
-        </p:txBody>
-      </p:sp>
-      <p:sp>
-        <p:nvSpPr>
-          <p:cNvPr id="3" name="Espace réservé du contenu 2">
-            <a:extLst>
-              <a:ext uri="{FF2B5EF4-FFF2-40B4-BE49-F238E27FC236}">
-                <a16:creationId xmlns:a16="http://schemas.microsoft.com/office/drawing/2014/main" id="{F7236C77-F8F5-EF94-AB75-3DBF5DE0FA93}"/>
-              </a:ext>
-            </a:extLst>
-          </p:cNvPr>
-          <p:cNvSpPr>
-            <a:spLocks noGrp="1"/>
-          </p:cNvSpPr>
+              <a:rPr lang="fr-FR" dirty="0"/>
+              <a:t>Photos branchements</a:t>
+            </a:r>
+            <a:endParaRPr lang="fr-BE" dirty="0"/>
+          </a:p>
+        </p:txBody>
+      </p:sp>
+      <p:pic>
+        <p:nvPicPr>
+          <p:cNvPr id="1026" name="Picture 2">
+            <a:extLst>
+              <a:ext uri="{FF2B5EF4-FFF2-40B4-BE49-F238E27FC236}">
+                <a16:creationId xmlns:a16="http://schemas.microsoft.com/office/drawing/2014/main" id="{56CE4EA1-34EE-9F09-FE69-954174096177}"/>
+              </a:ext>
+            </a:extLst>
+          </p:cNvPr>
+          <p:cNvPicPr>
+            <a:picLocks noGrp="1" noChangeAspect="1" noChangeArrowheads="1"/>
+          </p:cNvPicPr>
           <p:nvPr>
             <p:ph idx="1"/>
           </p:nvPr>
-        </p:nvSpPr>
-        <p:spPr/>
-        <p:txBody>
-          <a:bodyPr/>
-          <a:lstStyle/>
-          <a:p>
-            <a:r>
-              <a:rPr lang="fr-FR" dirty="0"/>
-              <a:t>Pour faire les schémas électrique</a:t>
-            </a:r>
-          </a:p>
-        </p:txBody>
-      </p:sp>
+        </p:nvPicPr>
+        <p:blipFill>
+          <a:blip r:embed="rId2">
+            <a:extLst>
+              <a:ext uri="{28A0092B-C50C-407E-A947-70E740481C1C}">
+                <a14:useLocalDpi xmlns:a14="http://schemas.microsoft.com/office/drawing/2010/main" val="0"/>
+              </a:ext>
+            </a:extLst>
+          </a:blip>
+          <a:srcRect/>
+          <a:stretch>
+            <a:fillRect/>
+          </a:stretch>
+        </p:blipFill>
+        <p:spPr bwMode="auto">
+          <a:xfrm>
+            <a:off x="6524791" y="738135"/>
+            <a:ext cx="4410153" cy="5880205"/>
+          </a:xfrm>
+          <a:prstGeom prst="rect">
+            <a:avLst/>
+          </a:prstGeom>
+          <a:noFill/>
+          <a:extLst>
+            <a:ext uri="{909E8E84-426E-40DD-AFC4-6F175D3DCCD1}">
+              <a14:hiddenFill xmlns:a14="http://schemas.microsoft.com/office/drawing/2010/main">
+                <a:solidFill>
+                  <a:srgbClr val="FFFFFF"/>
+                </a:solidFill>
+              </a14:hiddenFill>
+            </a:ext>
+          </a:extLst>
+        </p:spPr>
+      </p:pic>
+      <p:pic>
+        <p:nvPicPr>
+          <p:cNvPr id="1028" name="Picture 4">
+            <a:extLst>
+              <a:ext uri="{FF2B5EF4-FFF2-40B4-BE49-F238E27FC236}">
+                <a16:creationId xmlns:a16="http://schemas.microsoft.com/office/drawing/2014/main" id="{1F0CD194-4BE4-B321-CDA6-14E3CC8974FD}"/>
+              </a:ext>
+            </a:extLst>
+          </p:cNvPr>
+          <p:cNvPicPr>
+            <a:picLocks noChangeAspect="1" noChangeArrowheads="1"/>
+          </p:cNvPicPr>
+          <p:nvPr/>
+        </p:nvPicPr>
+        <p:blipFill>
+          <a:blip r:embed="rId3">
+            <a:extLst>
+              <a:ext uri="{28A0092B-C50C-407E-A947-70E740481C1C}">
+                <a14:useLocalDpi xmlns:a14="http://schemas.microsoft.com/office/drawing/2010/main" val="0"/>
+              </a:ext>
+            </a:extLst>
+          </a:blip>
+          <a:srcRect/>
+          <a:stretch>
+            <a:fillRect/>
+          </a:stretch>
+        </p:blipFill>
+        <p:spPr bwMode="auto">
+          <a:xfrm>
+            <a:off x="936487" y="1457324"/>
+            <a:ext cx="3776663" cy="5035551"/>
+          </a:xfrm>
+          <a:prstGeom prst="rect">
+            <a:avLst/>
+          </a:prstGeom>
+          <a:noFill/>
+          <a:extLst>
+            <a:ext uri="{909E8E84-426E-40DD-AFC4-6F175D3DCCD1}">
+              <a14:hiddenFill xmlns:a14="http://schemas.microsoft.com/office/drawing/2010/main">
+                <a:solidFill>
+                  <a:srgbClr val="FFFFFF"/>
+                </a:solidFill>
+              </a14:hiddenFill>
+            </a:ext>
+          </a:extLst>
+        </p:spPr>
+      </p:pic>
     </p:spTree>
     <p:extLst>
       <p:ext uri="{BB962C8B-B14F-4D97-AF65-F5344CB8AC3E}">
-        <p14:creationId xmlns:p14="http://schemas.microsoft.com/office/powerpoint/2010/main" val="1010827793"/>
+        <p14:creationId xmlns:p14="http://schemas.microsoft.com/office/powerpoint/2010/main" val="3169386830"/>
+      </p:ext>
+    </p:extLst>
+  </p:cSld>
+  <p:clrMapOvr>
+    <a:masterClrMapping/>
+  </p:clrMapOvr>
+</p:sld>
+</file>
+
+<file path=ppt/slides/slide12.xml><?xml version="1.0" encoding="utf-8"?>
+<p:sld xmlns:a="http://schemas.openxmlformats.org/drawingml/2006/main" xmlns:r="http://schemas.openxmlformats.org/officeDocument/2006/relationships" xmlns:p="http://schemas.openxmlformats.org/presentationml/2006/main">
+  <p:cSld>
+    <p:spTree>
+      <p:nvGrpSpPr>
+        <p:cNvPr id="1" name=""/>
+        <p:cNvGrpSpPr/>
+        <p:nvPr/>
+      </p:nvGrpSpPr>
+      <p:grpSpPr>
+        <a:xfrm>
+          <a:off x="0" y="0"/>
+          <a:ext cx="0" cy="0"/>
+          <a:chOff x="0" y="0"/>
+          <a:chExt cx="0" cy="0"/>
+        </a:xfrm>
+      </p:grpSpPr>
+      <p:sp>
+        <p:nvSpPr>
+          <p:cNvPr id="2" name="Titre 1">
+            <a:extLst>
+              <a:ext uri="{FF2B5EF4-FFF2-40B4-BE49-F238E27FC236}">
+                <a16:creationId xmlns:a16="http://schemas.microsoft.com/office/drawing/2014/main" id="{35FF3A86-CDBA-B37D-E4B1-1CD0A63F9974}"/>
+              </a:ext>
+            </a:extLst>
+          </p:cNvPr>
+          <p:cNvSpPr>
+            <a:spLocks noGrp="1"/>
+          </p:cNvSpPr>
+          <p:nvPr>
+            <p:ph type="title"/>
+          </p:nvPr>
+        </p:nvSpPr>
+        <p:spPr/>
+        <p:txBody>
+          <a:bodyPr/>
+          <a:lstStyle/>
+          <a:p>
+            <a:r>
+              <a:rPr lang="fr-FR" dirty="0"/>
+              <a:t>Test 10/02</a:t>
+            </a:r>
+            <a:endParaRPr lang="fr-BE" dirty="0"/>
+          </a:p>
+        </p:txBody>
+      </p:sp>
+      <p:pic>
+        <p:nvPicPr>
+          <p:cNvPr id="1026" name="Picture 2">
+            <a:extLst>
+              <a:ext uri="{FF2B5EF4-FFF2-40B4-BE49-F238E27FC236}">
+                <a16:creationId xmlns:a16="http://schemas.microsoft.com/office/drawing/2014/main" id="{26971460-5420-E53F-A119-57763F5CD407}"/>
+              </a:ext>
+            </a:extLst>
+          </p:cNvPr>
+          <p:cNvPicPr>
+            <a:picLocks noGrp="1" noChangeAspect="1" noChangeArrowheads="1"/>
+          </p:cNvPicPr>
+          <p:nvPr>
+            <p:ph idx="1"/>
+          </p:nvPr>
+        </p:nvPicPr>
+        <p:blipFill>
+          <a:blip r:embed="rId2">
+            <a:extLst>
+              <a:ext uri="{28A0092B-C50C-407E-A947-70E740481C1C}">
+                <a14:useLocalDpi xmlns:a14="http://schemas.microsoft.com/office/drawing/2010/main" val="0"/>
+              </a:ext>
+            </a:extLst>
+          </a:blip>
+          <a:srcRect/>
+          <a:stretch>
+            <a:fillRect/>
+          </a:stretch>
+        </p:blipFill>
+        <p:spPr bwMode="auto">
+          <a:xfrm>
+            <a:off x="1717295" y="1825625"/>
+            <a:ext cx="8757409" cy="4351338"/>
+          </a:xfrm>
+          <a:prstGeom prst="rect">
+            <a:avLst/>
+          </a:prstGeom>
+          <a:noFill/>
+          <a:extLst>
+            <a:ext uri="{909E8E84-426E-40DD-AFC4-6F175D3DCCD1}">
+              <a14:hiddenFill xmlns:a14="http://schemas.microsoft.com/office/drawing/2010/main">
+                <a:solidFill>
+                  <a:srgbClr val="FFFFFF"/>
+                </a:solidFill>
+              </a14:hiddenFill>
+            </a:ext>
+          </a:extLst>
+        </p:spPr>
+      </p:pic>
+    </p:spTree>
+    <p:extLst>
+      <p:ext uri="{BB962C8B-B14F-4D97-AF65-F5344CB8AC3E}">
+        <p14:creationId xmlns:p14="http://schemas.microsoft.com/office/powerpoint/2010/main" val="2331211281"/>
       </p:ext>
     </p:extLst>
   </p:cSld>
@@ -4640,9 +3844,12 @@
           <a:lstStyle/>
           <a:p>
             <a:r>
-              <a:rPr lang="fr-FR" dirty="0"/>
+              <a:rPr lang="fr-FR" dirty="0">
+                <a:hlinkClick r:id="rId2"/>
+              </a:rPr>
               <a:t>https://www.instructables.com/search/?q=gps%20tracker&amp;projects=all</a:t>
             </a:r>
+            <a:endParaRPr lang="fr-FR" dirty="0"/>
           </a:p>
         </p:txBody>
       </p:sp>
@@ -4791,7 +3998,7 @@
           <p:cNvPr id="2" name="Titre 1">
             <a:extLst>
               <a:ext uri="{FF2B5EF4-FFF2-40B4-BE49-F238E27FC236}">
-                <a16:creationId xmlns:a16="http://schemas.microsoft.com/office/drawing/2014/main" id="{CBA4FCB8-AB97-32E2-C758-DD198A8E4828}"/>
+                <a16:creationId xmlns:a16="http://schemas.microsoft.com/office/drawing/2014/main" id="{4B27A265-A2F8-64B3-B02E-79CB3E6BF43C}"/>
               </a:ext>
             </a:extLst>
           </p:cNvPr>
@@ -4807,7 +4014,27 @@
           <a:bodyPr/>
           <a:lstStyle/>
           <a:p>
-            <a:endParaRPr lang="fr-FR"/>
+            <a:r>
+              <a:rPr lang="fr-FR" dirty="0" err="1">
+                <a:hlinkClick r:id="rId2"/>
+              </a:rPr>
+              <a:t>plerup</a:t>
+            </a:r>
+            <a:r>
+              <a:rPr lang="fr-FR" dirty="0"/>
+              <a:t> / </a:t>
+            </a:r>
+            <a:r>
+              <a:rPr lang="fr-FR" b="1" dirty="0" err="1">
+                <a:hlinkClick r:id="rId3"/>
+              </a:rPr>
+              <a:t>espsoftwareserial</a:t>
+            </a:r>
+            <a:r>
+              <a:rPr lang="fr-FR" b="1" dirty="0"/>
+              <a:t> </a:t>
+            </a:r>
+            <a:endParaRPr lang="fr-FR" dirty="0"/>
           </a:p>
         </p:txBody>
       </p:sp>
@@ -4816,7 +4043,7 @@
           <p:cNvPr id="3" name="Espace réservé du contenu 2">
             <a:extLst>
               <a:ext uri="{FF2B5EF4-FFF2-40B4-BE49-F238E27FC236}">
-                <a16:creationId xmlns:a16="http://schemas.microsoft.com/office/drawing/2014/main" id="{72319E86-569B-6C6A-9E93-59F448CE67EC}"/>
+                <a16:creationId xmlns:a16="http://schemas.microsoft.com/office/drawing/2014/main" id="{842D7F04-4318-AE33-FC23-5AA849FFCB77}"/>
               </a:ext>
             </a:extLst>
           </p:cNvPr>
@@ -4832,44 +4059,39 @@
           <a:bodyPr/>
           <a:lstStyle/>
           <a:p>
-            <a:endParaRPr lang="fr-FR"/>
-          </a:p>
-        </p:txBody>
-      </p:sp>
-      <p:pic>
-        <p:nvPicPr>
-          <p:cNvPr id="5" name="Image 4">
-            <a:extLst>
-              <a:ext uri="{FF2B5EF4-FFF2-40B4-BE49-F238E27FC236}">
-                <a16:creationId xmlns:a16="http://schemas.microsoft.com/office/drawing/2014/main" id="{BC5FABC8-2545-E44F-7FD9-56DCE8F33879}"/>
-              </a:ext>
-            </a:extLst>
-          </p:cNvPr>
-          <p:cNvPicPr>
-            <a:picLocks noChangeAspect="1"/>
-          </p:cNvPicPr>
-          <p:nvPr/>
-        </p:nvPicPr>
-        <p:blipFill>
-          <a:blip r:embed="rId2"/>
-          <a:stretch>
-            <a:fillRect/>
-          </a:stretch>
-        </p:blipFill>
-        <p:spPr>
-          <a:xfrm>
-            <a:off x="0" y="0"/>
-            <a:ext cx="12192000" cy="6858000"/>
-          </a:xfrm>
-          <a:prstGeom prst="rect">
-            <a:avLst/>
-          </a:prstGeom>
-        </p:spPr>
-      </p:pic>
+            <a:r>
+              <a:rPr lang="fr-FR" dirty="0">
+                <a:hlinkClick r:id="rId4"/>
+              </a:rPr>
+              <a:t>https://github.com/plerup/espsoftwareserial/</a:t>
+            </a:r>
+            <a:endParaRPr lang="fr-FR" dirty="0"/>
+          </a:p>
+          <a:p>
+            <a:r>
+              <a:rPr lang="fr-FR" dirty="0"/>
+              <a:t>Pas utile finalement, on utilise plutôt </a:t>
+            </a:r>
+            <a:r>
+              <a:rPr lang="fr-FR" dirty="0" err="1"/>
+              <a:t>SoftwareSerial</a:t>
+            </a:r>
+            <a:r>
+              <a:rPr lang="fr-FR" dirty="0"/>
+              <a:t> inclue de base </a:t>
+            </a:r>
+            <a:r>
+              <a:rPr lang="fr-FR"/>
+              <a:t>dans Arduino</a:t>
+            </a:r>
+            <a:endParaRPr lang="fr-FR" dirty="0"/>
+          </a:p>
+        </p:txBody>
+      </p:sp>
     </p:spTree>
     <p:extLst>
       <p:ext uri="{BB962C8B-B14F-4D97-AF65-F5344CB8AC3E}">
-        <p14:creationId xmlns:p14="http://schemas.microsoft.com/office/powerpoint/2010/main" val="4110387659"/>
+        <p14:creationId xmlns:p14="http://schemas.microsoft.com/office/powerpoint/2010/main" val="3366347065"/>
       </p:ext>
     </p:extLst>
   </p:cSld>
@@ -4901,109 +4123,6 @@
           <p:cNvPr id="2" name="Titre 1">
             <a:extLst>
               <a:ext uri="{FF2B5EF4-FFF2-40B4-BE49-F238E27FC236}">
-                <a16:creationId xmlns:a16="http://schemas.microsoft.com/office/drawing/2014/main" id="{4B27A265-A2F8-64B3-B02E-79CB3E6BF43C}"/>
-              </a:ext>
-            </a:extLst>
-          </p:cNvPr>
-          <p:cNvSpPr>
-            <a:spLocks noGrp="1"/>
-          </p:cNvSpPr>
-          <p:nvPr>
-            <p:ph type="title"/>
-          </p:nvPr>
-        </p:nvSpPr>
-        <p:spPr/>
-        <p:txBody>
-          <a:bodyPr/>
-          <a:lstStyle/>
-          <a:p>
-            <a:r>
-              <a:rPr lang="fr-FR" dirty="0" err="1">
-                <a:hlinkClick r:id="rId2"/>
-              </a:rPr>
-              <a:t>plerup</a:t>
-            </a:r>
-            <a:r>
-              <a:rPr lang="fr-FR" dirty="0"/>
-              <a:t> / </a:t>
-            </a:r>
-            <a:r>
-              <a:rPr lang="fr-FR" b="1" dirty="0" err="1">
-                <a:hlinkClick r:id="rId3"/>
-              </a:rPr>
-              <a:t>espsoftwareserial</a:t>
-            </a:r>
-            <a:r>
-              <a:rPr lang="fr-FR" b="1" dirty="0"/>
-              <a:t> </a:t>
-            </a:r>
-            <a:endParaRPr lang="fr-FR" dirty="0"/>
-          </a:p>
-        </p:txBody>
-      </p:sp>
-      <p:sp>
-        <p:nvSpPr>
-          <p:cNvPr id="3" name="Espace réservé du contenu 2">
-            <a:extLst>
-              <a:ext uri="{FF2B5EF4-FFF2-40B4-BE49-F238E27FC236}">
-                <a16:creationId xmlns:a16="http://schemas.microsoft.com/office/drawing/2014/main" id="{842D7F04-4318-AE33-FC23-5AA849FFCB77}"/>
-              </a:ext>
-            </a:extLst>
-          </p:cNvPr>
-          <p:cNvSpPr>
-            <a:spLocks noGrp="1"/>
-          </p:cNvSpPr>
-          <p:nvPr>
-            <p:ph idx="1"/>
-          </p:nvPr>
-        </p:nvSpPr>
-        <p:spPr/>
-        <p:txBody>
-          <a:bodyPr/>
-          <a:lstStyle/>
-          <a:p>
-            <a:r>
-              <a:rPr lang="fr-FR" dirty="0"/>
-              <a:t>https://github.com/plerup/espsoftwareserial/</a:t>
-            </a:r>
-          </a:p>
-        </p:txBody>
-      </p:sp>
-    </p:spTree>
-    <p:extLst>
-      <p:ext uri="{BB962C8B-B14F-4D97-AF65-F5344CB8AC3E}">
-        <p14:creationId xmlns:p14="http://schemas.microsoft.com/office/powerpoint/2010/main" val="3366347065"/>
-      </p:ext>
-    </p:extLst>
-  </p:cSld>
-  <p:clrMapOvr>
-    <a:masterClrMapping/>
-  </p:clrMapOvr>
-</p:sld>
-</file>
-
-<file path=ppt/slides/slide6.xml><?xml version="1.0" encoding="utf-8"?>
-<p:sld xmlns:a="http://schemas.openxmlformats.org/drawingml/2006/main" xmlns:r="http://schemas.openxmlformats.org/officeDocument/2006/relationships" xmlns:p="http://schemas.openxmlformats.org/presentationml/2006/main">
-  <p:cSld>
-    <p:spTree>
-      <p:nvGrpSpPr>
-        <p:cNvPr id="1" name=""/>
-        <p:cNvGrpSpPr/>
-        <p:nvPr/>
-      </p:nvGrpSpPr>
-      <p:grpSpPr>
-        <a:xfrm>
-          <a:off x="0" y="0"/>
-          <a:ext cx="0" cy="0"/>
-          <a:chOff x="0" y="0"/>
-          <a:chExt cx="0" cy="0"/>
-        </a:xfrm>
-      </p:grpSpPr>
-      <p:sp>
-        <p:nvSpPr>
-          <p:cNvPr id="2" name="Titre 1">
-            <a:extLst>
-              <a:ext uri="{FF2B5EF4-FFF2-40B4-BE49-F238E27FC236}">
                 <a16:creationId xmlns:a16="http://schemas.microsoft.com/office/drawing/2014/main" id="{A9B46718-9833-EA3B-B989-47EDB1478C2C}"/>
               </a:ext>
             </a:extLst>
@@ -5302,7 +4421,7 @@
 </p:sld>
 </file>
 
-<file path=ppt/slides/slide7.xml><?xml version="1.0" encoding="utf-8"?>
+<file path=ppt/slides/slide6.xml><?xml version="1.0" encoding="utf-8"?>
 <p:sld xmlns:a="http://schemas.openxmlformats.org/drawingml/2006/main" xmlns:r="http://schemas.openxmlformats.org/officeDocument/2006/relationships" xmlns:p="http://schemas.openxmlformats.org/presentationml/2006/main">
   <p:cSld>
     <p:spTree>
@@ -5431,7 +4550,7 @@
 </p:sld>
 </file>
 
-<file path=ppt/slides/slide8.xml><?xml version="1.0" encoding="utf-8"?>
+<file path=ppt/slides/slide7.xml><?xml version="1.0" encoding="utf-8"?>
 <p:sld xmlns:a="http://schemas.openxmlformats.org/drawingml/2006/main" xmlns:r="http://schemas.openxmlformats.org/officeDocument/2006/relationships" xmlns:p="http://schemas.openxmlformats.org/presentationml/2006/main">
   <p:cSld>
     <p:spTree>
@@ -5568,6 +4687,105 @@
 </p:sld>
 </file>
 
+<file path=ppt/slides/slide8.xml><?xml version="1.0" encoding="utf-8"?>
+<p:sld xmlns:a="http://schemas.openxmlformats.org/drawingml/2006/main" xmlns:r="http://schemas.openxmlformats.org/officeDocument/2006/relationships" xmlns:p="http://schemas.openxmlformats.org/presentationml/2006/main">
+  <p:cSld>
+    <p:spTree>
+      <p:nvGrpSpPr>
+        <p:cNvPr id="1" name=""/>
+        <p:cNvGrpSpPr/>
+        <p:nvPr/>
+      </p:nvGrpSpPr>
+      <p:grpSpPr>
+        <a:xfrm>
+          <a:off x="0" y="0"/>
+          <a:ext cx="0" cy="0"/>
+          <a:chOff x="0" y="0"/>
+          <a:chExt cx="0" cy="0"/>
+        </a:xfrm>
+      </p:grpSpPr>
+      <p:sp>
+        <p:nvSpPr>
+          <p:cNvPr id="2" name="Titre 1">
+            <a:extLst>
+              <a:ext uri="{FF2B5EF4-FFF2-40B4-BE49-F238E27FC236}">
+                <a16:creationId xmlns:a16="http://schemas.microsoft.com/office/drawing/2014/main" id="{2A46F71B-8B62-6DED-EDC9-65FA55500E23}"/>
+              </a:ext>
+            </a:extLst>
+          </p:cNvPr>
+          <p:cNvSpPr>
+            <a:spLocks noGrp="1"/>
+          </p:cNvSpPr>
+          <p:nvPr>
+            <p:ph type="title"/>
+          </p:nvPr>
+        </p:nvSpPr>
+        <p:spPr>
+          <a:xfrm>
+            <a:off x="838200" y="228600"/>
+            <a:ext cx="10515600" cy="1325563"/>
+          </a:xfrm>
+        </p:spPr>
+        <p:txBody>
+          <a:bodyPr/>
+          <a:lstStyle/>
+          <a:p>
+            <a:r>
+              <a:rPr lang="en-US" dirty="0" err="1"/>
+              <a:t>TinyGPSplus</a:t>
+            </a:r>
+            <a:endParaRPr lang="fr-FR" dirty="0"/>
+          </a:p>
+        </p:txBody>
+      </p:sp>
+      <p:sp>
+        <p:nvSpPr>
+          <p:cNvPr id="3" name="Espace réservé du contenu 2">
+            <a:extLst>
+              <a:ext uri="{FF2B5EF4-FFF2-40B4-BE49-F238E27FC236}">
+                <a16:creationId xmlns:a16="http://schemas.microsoft.com/office/drawing/2014/main" id="{C892AF7E-29F6-A563-4249-D4BBD351841F}"/>
+              </a:ext>
+            </a:extLst>
+          </p:cNvPr>
+          <p:cNvSpPr>
+            <a:spLocks noGrp="1"/>
+          </p:cNvSpPr>
+          <p:nvPr>
+            <p:ph idx="1"/>
+          </p:nvPr>
+        </p:nvSpPr>
+        <p:spPr/>
+        <p:txBody>
+          <a:bodyPr/>
+          <a:lstStyle/>
+          <a:p>
+            <a:r>
+              <a:rPr lang="en-US" dirty="0" err="1"/>
+              <a:t>TinyGPS</a:t>
+            </a:r>
+            <a:r>
+              <a:rPr lang="en-US" dirty="0"/>
+              <a:t>++ is a new Arduino library for parsing NMEA data streams provided by GPS modules.</a:t>
+            </a:r>
+          </a:p>
+          <a:p>
+            <a:endParaRPr lang="fr-FR" dirty="0"/>
+          </a:p>
+        </p:txBody>
+      </p:sp>
+    </p:spTree>
+    <p:extLst>
+      <p:ext uri="{BB962C8B-B14F-4D97-AF65-F5344CB8AC3E}">
+        <p14:creationId xmlns:p14="http://schemas.microsoft.com/office/powerpoint/2010/main" val="1917717794"/>
+      </p:ext>
+    </p:extLst>
+  </p:cSld>
+  <p:clrMapOvr>
+    <a:masterClrMapping/>
+  </p:clrMapOvr>
+</p:sld>
+</file>
+
 <file path=ppt/slides/slide9.xml><?xml version="1.0" encoding="utf-8"?>
 <p:sld xmlns:a="http://schemas.openxmlformats.org/drawingml/2006/main" xmlns:r="http://schemas.openxmlformats.org/officeDocument/2006/relationships" xmlns:p="http://schemas.openxmlformats.org/presentationml/2006/main">
   <p:cSld>
@@ -5590,7 +4808,7 @@
           <p:cNvPr id="2" name="Titre 1">
             <a:extLst>
               <a:ext uri="{FF2B5EF4-FFF2-40B4-BE49-F238E27FC236}">
-                <a16:creationId xmlns:a16="http://schemas.microsoft.com/office/drawing/2014/main" id="{2A46F71B-8B62-6DED-EDC9-65FA55500E23}"/>
+                <a16:creationId xmlns:a16="http://schemas.microsoft.com/office/drawing/2014/main" id="{44BC1E36-AE13-32BC-18E6-EE70044697EF}"/>
               </a:ext>
             </a:extLst>
           </p:cNvPr>
@@ -5599,65 +4817,1026 @@
           </p:cNvSpPr>
           <p:nvPr>
             <p:ph type="title"/>
+          </p:nvPr>
+        </p:nvSpPr>
+        <p:spPr/>
+        <p:txBody>
+          <a:bodyPr/>
+          <a:lstStyle/>
+          <a:p>
+            <a:r>
+              <a:rPr lang="fr-FR" dirty="0" err="1"/>
+              <a:t>TinyGPSplus</a:t>
+            </a:r>
+            <a:r>
+              <a:rPr lang="fr-FR" dirty="0"/>
+              <a:t>: Toutes les données </a:t>
+            </a:r>
+            <a:r>
+              <a:rPr lang="fr-FR" dirty="0" err="1"/>
+              <a:t>extractables</a:t>
+            </a:r>
+            <a:endParaRPr lang="fr-FR" dirty="0"/>
+          </a:p>
+        </p:txBody>
+      </p:sp>
+      <p:sp>
+        <p:nvSpPr>
+          <p:cNvPr id="3" name="Espace réservé du contenu 2">
+            <a:extLst>
+              <a:ext uri="{FF2B5EF4-FFF2-40B4-BE49-F238E27FC236}">
+                <a16:creationId xmlns:a16="http://schemas.microsoft.com/office/drawing/2014/main" id="{2F4F42FF-596B-550B-F70A-95ACA60245F5}"/>
+              </a:ext>
+            </a:extLst>
+          </p:cNvPr>
+          <p:cNvSpPr>
+            <a:spLocks noGrp="1"/>
+          </p:cNvSpPr>
+          <p:nvPr>
+            <p:ph idx="1"/>
           </p:nvPr>
         </p:nvSpPr>
         <p:spPr>
           <a:xfrm>
-            <a:off x="838200" y="228600"/>
-            <a:ext cx="10515600" cy="1325563"/>
+            <a:off x="838200" y="1825625"/>
+            <a:ext cx="10515600" cy="4667250"/>
           </a:xfrm>
         </p:spPr>
         <p:txBody>
-          <a:bodyPr/>
-          <a:lstStyle/>
-          <a:p>
-            <a:r>
-              <a:rPr lang="en-US" dirty="0" err="1"/>
-              <a:t>TinyGPSplus</a:t>
-            </a:r>
-            <a:endParaRPr lang="fr-FR" dirty="0"/>
-          </a:p>
-        </p:txBody>
-      </p:sp>
-      <p:sp>
-        <p:nvSpPr>
-          <p:cNvPr id="3" name="Espace réservé du contenu 2">
-            <a:extLst>
-              <a:ext uri="{FF2B5EF4-FFF2-40B4-BE49-F238E27FC236}">
-                <a16:creationId xmlns:a16="http://schemas.microsoft.com/office/drawing/2014/main" id="{C892AF7E-29F6-A563-4249-D4BBD351841F}"/>
-              </a:ext>
-            </a:extLst>
-          </p:cNvPr>
-          <p:cNvSpPr>
-            <a:spLocks noGrp="1"/>
-          </p:cNvSpPr>
-          <p:nvPr>
-            <p:ph idx="1"/>
-          </p:nvPr>
-        </p:nvSpPr>
-        <p:spPr/>
-        <p:txBody>
-          <a:bodyPr/>
-          <a:lstStyle/>
-          <a:p>
-            <a:r>
-              <a:rPr lang="en-US" dirty="0" err="1"/>
-              <a:t>TinyGPS</a:t>
-            </a:r>
-            <a:r>
-              <a:rPr lang="en-US" dirty="0"/>
-              <a:t>++ is a new Arduino library for parsing NMEA data streams provided by GPS modules.</a:t>
-            </a:r>
-          </a:p>
-          <a:p>
-            <a:endParaRPr lang="fr-FR" dirty="0"/>
+          <a:bodyPr>
+            <a:normAutofit fontScale="25000" lnSpcReduction="20000"/>
+          </a:bodyPr>
+          <a:lstStyle/>
+          <a:p>
+            <a:pPr marL="0" marR="0" lvl="0" indent="0" algn="l" defTabSz="914400" rtl="0" eaLnBrk="0" fontAlgn="base" latinLnBrk="0" hangingPunct="0">
+              <a:lnSpc>
+                <a:spcPct val="100000"/>
+              </a:lnSpc>
+              <a:spcBef>
+                <a:spcPct val="0"/>
+              </a:spcBef>
+              <a:spcAft>
+                <a:spcPct val="0"/>
+              </a:spcAft>
+              <a:buClrTx/>
+              <a:buSzTx/>
+              <a:buFontTx/>
+              <a:buNone/>
+              <a:tabLst/>
+            </a:pPr>
+            <a:r>
+              <a:rPr kumimoji="0" lang="fr-FR" altLang="fr-FR" sz="4800" b="0" i="0" u="none" strike="noStrike" cap="none" normalizeH="0" baseline="0" noProof="1">
+                <a:ln>
+                  <a:noFill/>
+                </a:ln>
+                <a:solidFill>
+                  <a:schemeClr val="tx1"/>
+                </a:solidFill>
+                <a:effectLst/>
+                <a:latin typeface="Consolas" panose="020B0609020204030204" pitchFamily="49" charset="0"/>
+              </a:rPr>
+              <a:t>Serial.println(gps.location.lat(), 6); // Latitude in degrees (double)</a:t>
+            </a:r>
+          </a:p>
+          <a:p>
+            <a:pPr marL="0" marR="0" lvl="0" indent="0" algn="l" defTabSz="914400" rtl="0" eaLnBrk="0" fontAlgn="base" latinLnBrk="0" hangingPunct="0">
+              <a:lnSpc>
+                <a:spcPct val="100000"/>
+              </a:lnSpc>
+              <a:spcBef>
+                <a:spcPct val="0"/>
+              </a:spcBef>
+              <a:spcAft>
+                <a:spcPct val="0"/>
+              </a:spcAft>
+              <a:buClrTx/>
+              <a:buSzTx/>
+              <a:buFontTx/>
+              <a:buNone/>
+              <a:tabLst/>
+            </a:pPr>
+            <a:r>
+              <a:rPr kumimoji="0" lang="fr-FR" altLang="fr-FR" sz="4800" b="0" i="0" u="none" strike="noStrike" cap="none" normalizeH="0" baseline="0" noProof="1">
+                <a:ln>
+                  <a:noFill/>
+                </a:ln>
+                <a:solidFill>
+                  <a:schemeClr val="tx1"/>
+                </a:solidFill>
+                <a:effectLst/>
+                <a:latin typeface="Consolas" panose="020B0609020204030204" pitchFamily="49" charset="0"/>
+              </a:rPr>
+              <a:t>Serial.println(gps.location.lng(), 6); // Longitude in degrees (double)</a:t>
+            </a:r>
+          </a:p>
+          <a:p>
+            <a:pPr marL="0" marR="0" lvl="0" indent="0" algn="l" defTabSz="914400" rtl="0" eaLnBrk="0" fontAlgn="base" latinLnBrk="0" hangingPunct="0">
+              <a:lnSpc>
+                <a:spcPct val="100000"/>
+              </a:lnSpc>
+              <a:spcBef>
+                <a:spcPct val="0"/>
+              </a:spcBef>
+              <a:spcAft>
+                <a:spcPct val="0"/>
+              </a:spcAft>
+              <a:buClrTx/>
+              <a:buSzTx/>
+              <a:buFontTx/>
+              <a:buNone/>
+              <a:tabLst/>
+            </a:pPr>
+            <a:r>
+              <a:rPr kumimoji="0" lang="fr-FR" altLang="fr-FR" sz="4800" b="0" i="0" u="none" strike="noStrike" cap="none" normalizeH="0" baseline="0" noProof="1">
+                <a:ln>
+                  <a:noFill/>
+                </a:ln>
+                <a:solidFill>
+                  <a:schemeClr val="tx1"/>
+                </a:solidFill>
+                <a:effectLst/>
+                <a:latin typeface="Consolas" panose="020B0609020204030204" pitchFamily="49" charset="0"/>
+              </a:rPr>
+              <a:t>Serial.print(gps.location.rawLat().negative ? "-" : "+");</a:t>
+            </a:r>
+          </a:p>
+          <a:p>
+            <a:pPr marL="0" marR="0" lvl="0" indent="0" algn="l" defTabSz="914400" rtl="0" eaLnBrk="0" fontAlgn="base" latinLnBrk="0" hangingPunct="0">
+              <a:lnSpc>
+                <a:spcPct val="100000"/>
+              </a:lnSpc>
+              <a:spcBef>
+                <a:spcPct val="0"/>
+              </a:spcBef>
+              <a:spcAft>
+                <a:spcPct val="0"/>
+              </a:spcAft>
+              <a:buClrTx/>
+              <a:buSzTx/>
+              <a:buFontTx/>
+              <a:buNone/>
+              <a:tabLst/>
+            </a:pPr>
+            <a:r>
+              <a:rPr kumimoji="0" lang="fr-FR" altLang="fr-FR" sz="4800" b="0" i="0" u="none" strike="noStrike" cap="none" normalizeH="0" baseline="0" noProof="1">
+                <a:ln>
+                  <a:noFill/>
+                </a:ln>
+                <a:solidFill>
+                  <a:schemeClr val="tx1"/>
+                </a:solidFill>
+                <a:effectLst/>
+                <a:latin typeface="Consolas" panose="020B0609020204030204" pitchFamily="49" charset="0"/>
+              </a:rPr>
+              <a:t>Serial.println(gps.location.rawLat().deg); // Raw latitude in whole degrees</a:t>
+            </a:r>
+          </a:p>
+          <a:p>
+            <a:pPr marL="0" marR="0" lvl="0" indent="0" algn="l" defTabSz="914400" rtl="0" eaLnBrk="0" fontAlgn="base" latinLnBrk="0" hangingPunct="0">
+              <a:lnSpc>
+                <a:spcPct val="100000"/>
+              </a:lnSpc>
+              <a:spcBef>
+                <a:spcPct val="0"/>
+              </a:spcBef>
+              <a:spcAft>
+                <a:spcPct val="0"/>
+              </a:spcAft>
+              <a:buClrTx/>
+              <a:buSzTx/>
+              <a:buFontTx/>
+              <a:buNone/>
+              <a:tabLst/>
+            </a:pPr>
+            <a:r>
+              <a:rPr kumimoji="0" lang="fr-FR" altLang="fr-FR" sz="4800" b="0" i="0" u="none" strike="noStrike" cap="none" normalizeH="0" baseline="0" noProof="1">
+                <a:ln>
+                  <a:noFill/>
+                </a:ln>
+                <a:solidFill>
+                  <a:schemeClr val="tx1"/>
+                </a:solidFill>
+                <a:effectLst/>
+                <a:latin typeface="Consolas" panose="020B0609020204030204" pitchFamily="49" charset="0"/>
+              </a:rPr>
+              <a:t>Serial.println(gps.location.rawLat().billionths);// ... and billionths (u16/u32)</a:t>
+            </a:r>
+          </a:p>
+          <a:p>
+            <a:pPr marL="0" marR="0" lvl="0" indent="0" algn="l" defTabSz="914400" rtl="0" eaLnBrk="0" fontAlgn="base" latinLnBrk="0" hangingPunct="0">
+              <a:lnSpc>
+                <a:spcPct val="100000"/>
+              </a:lnSpc>
+              <a:spcBef>
+                <a:spcPct val="0"/>
+              </a:spcBef>
+              <a:spcAft>
+                <a:spcPct val="0"/>
+              </a:spcAft>
+              <a:buClrTx/>
+              <a:buSzTx/>
+              <a:buFontTx/>
+              <a:buNone/>
+              <a:tabLst/>
+            </a:pPr>
+            <a:r>
+              <a:rPr kumimoji="0" lang="fr-FR" altLang="fr-FR" sz="4800" b="0" i="0" u="none" strike="noStrike" cap="none" normalizeH="0" baseline="0" noProof="1">
+                <a:ln>
+                  <a:noFill/>
+                </a:ln>
+                <a:solidFill>
+                  <a:schemeClr val="tx1"/>
+                </a:solidFill>
+                <a:effectLst/>
+                <a:latin typeface="Consolas" panose="020B0609020204030204" pitchFamily="49" charset="0"/>
+              </a:rPr>
+              <a:t>Serial.print(gps.location.rawLng().negative ? "-" : "+");</a:t>
+            </a:r>
+          </a:p>
+          <a:p>
+            <a:pPr marL="0" marR="0" lvl="0" indent="0" algn="l" defTabSz="914400" rtl="0" eaLnBrk="0" fontAlgn="base" latinLnBrk="0" hangingPunct="0">
+              <a:lnSpc>
+                <a:spcPct val="100000"/>
+              </a:lnSpc>
+              <a:spcBef>
+                <a:spcPct val="0"/>
+              </a:spcBef>
+              <a:spcAft>
+                <a:spcPct val="0"/>
+              </a:spcAft>
+              <a:buClrTx/>
+              <a:buSzTx/>
+              <a:buFontTx/>
+              <a:buNone/>
+              <a:tabLst/>
+            </a:pPr>
+            <a:r>
+              <a:rPr kumimoji="0" lang="fr-FR" altLang="fr-FR" sz="4800" b="0" i="0" u="none" strike="noStrike" cap="none" normalizeH="0" baseline="0" noProof="1">
+                <a:ln>
+                  <a:noFill/>
+                </a:ln>
+                <a:solidFill>
+                  <a:schemeClr val="tx1"/>
+                </a:solidFill>
+                <a:effectLst/>
+                <a:latin typeface="Consolas" panose="020B0609020204030204" pitchFamily="49" charset="0"/>
+              </a:rPr>
+              <a:t>Serial.println(gps.location.rawLng().deg); // Raw longitude in whole degrees</a:t>
+            </a:r>
+          </a:p>
+          <a:p>
+            <a:pPr marL="0" marR="0" lvl="0" indent="0" algn="l" defTabSz="914400" rtl="0" eaLnBrk="0" fontAlgn="base" latinLnBrk="0" hangingPunct="0">
+              <a:lnSpc>
+                <a:spcPct val="100000"/>
+              </a:lnSpc>
+              <a:spcBef>
+                <a:spcPct val="0"/>
+              </a:spcBef>
+              <a:spcAft>
+                <a:spcPct val="0"/>
+              </a:spcAft>
+              <a:buClrTx/>
+              <a:buSzTx/>
+              <a:buFontTx/>
+              <a:buNone/>
+              <a:tabLst/>
+            </a:pPr>
+            <a:r>
+              <a:rPr kumimoji="0" lang="fr-FR" altLang="fr-FR" sz="4800" b="0" i="0" u="none" strike="noStrike" cap="none" normalizeH="0" baseline="0" noProof="1">
+                <a:ln>
+                  <a:noFill/>
+                </a:ln>
+                <a:solidFill>
+                  <a:schemeClr val="tx1"/>
+                </a:solidFill>
+                <a:effectLst/>
+                <a:latin typeface="Consolas" panose="020B0609020204030204" pitchFamily="49" charset="0"/>
+              </a:rPr>
+              <a:t>Serial.println(gps.location.rawLng().billionths);// ... and billionths (u16/u32)</a:t>
+            </a:r>
+          </a:p>
+          <a:p>
+            <a:pPr marL="0" marR="0" lvl="0" indent="0" algn="l" defTabSz="914400" rtl="0" eaLnBrk="0" fontAlgn="base" latinLnBrk="0" hangingPunct="0">
+              <a:lnSpc>
+                <a:spcPct val="100000"/>
+              </a:lnSpc>
+              <a:spcBef>
+                <a:spcPct val="0"/>
+              </a:spcBef>
+              <a:spcAft>
+                <a:spcPct val="0"/>
+              </a:spcAft>
+              <a:buClrTx/>
+              <a:buSzTx/>
+              <a:buFontTx/>
+              <a:buNone/>
+              <a:tabLst/>
+            </a:pPr>
+            <a:r>
+              <a:rPr kumimoji="0" lang="fr-FR" altLang="fr-FR" sz="4800" b="0" i="0" u="none" strike="noStrike" cap="none" normalizeH="0" baseline="0" noProof="1">
+                <a:ln>
+                  <a:noFill/>
+                </a:ln>
+                <a:solidFill>
+                  <a:schemeClr val="tx1"/>
+                </a:solidFill>
+                <a:effectLst/>
+                <a:latin typeface="Consolas" panose="020B0609020204030204" pitchFamily="49" charset="0"/>
+              </a:rPr>
+              <a:t>Serial.println(gps.date.value()); // Raw date in DDMMYY format (u32)</a:t>
+            </a:r>
+          </a:p>
+          <a:p>
+            <a:pPr marL="0" marR="0" lvl="0" indent="0" algn="l" defTabSz="914400" rtl="0" eaLnBrk="0" fontAlgn="base" latinLnBrk="0" hangingPunct="0">
+              <a:lnSpc>
+                <a:spcPct val="100000"/>
+              </a:lnSpc>
+              <a:spcBef>
+                <a:spcPct val="0"/>
+              </a:spcBef>
+              <a:spcAft>
+                <a:spcPct val="0"/>
+              </a:spcAft>
+              <a:buClrTx/>
+              <a:buSzTx/>
+              <a:buFontTx/>
+              <a:buNone/>
+              <a:tabLst/>
+            </a:pPr>
+            <a:r>
+              <a:rPr kumimoji="0" lang="fr-FR" altLang="fr-FR" sz="4800" b="0" i="0" u="none" strike="noStrike" cap="none" normalizeH="0" baseline="0" noProof="1">
+                <a:ln>
+                  <a:noFill/>
+                </a:ln>
+                <a:solidFill>
+                  <a:schemeClr val="tx1"/>
+                </a:solidFill>
+                <a:effectLst/>
+                <a:latin typeface="Consolas" panose="020B0609020204030204" pitchFamily="49" charset="0"/>
+              </a:rPr>
+              <a:t>Serial.println(gps.date.year()); // Year (2000+) (u16)</a:t>
+            </a:r>
+          </a:p>
+          <a:p>
+            <a:pPr marL="0" marR="0" lvl="0" indent="0" algn="l" defTabSz="914400" rtl="0" eaLnBrk="0" fontAlgn="base" latinLnBrk="0" hangingPunct="0">
+              <a:lnSpc>
+                <a:spcPct val="100000"/>
+              </a:lnSpc>
+              <a:spcBef>
+                <a:spcPct val="0"/>
+              </a:spcBef>
+              <a:spcAft>
+                <a:spcPct val="0"/>
+              </a:spcAft>
+              <a:buClrTx/>
+              <a:buSzTx/>
+              <a:buFontTx/>
+              <a:buNone/>
+              <a:tabLst/>
+            </a:pPr>
+            <a:r>
+              <a:rPr kumimoji="0" lang="fr-FR" altLang="fr-FR" sz="4800" b="0" i="0" u="none" strike="noStrike" cap="none" normalizeH="0" baseline="0" noProof="1">
+                <a:ln>
+                  <a:noFill/>
+                </a:ln>
+                <a:solidFill>
+                  <a:schemeClr val="tx1"/>
+                </a:solidFill>
+                <a:effectLst/>
+                <a:latin typeface="Consolas" panose="020B0609020204030204" pitchFamily="49" charset="0"/>
+              </a:rPr>
+              <a:t>Serial.println(gps.date.month()); // Month (1-12) (u8)</a:t>
+            </a:r>
+          </a:p>
+          <a:p>
+            <a:pPr marL="0" marR="0" lvl="0" indent="0" algn="l" defTabSz="914400" rtl="0" eaLnBrk="0" fontAlgn="base" latinLnBrk="0" hangingPunct="0">
+              <a:lnSpc>
+                <a:spcPct val="100000"/>
+              </a:lnSpc>
+              <a:spcBef>
+                <a:spcPct val="0"/>
+              </a:spcBef>
+              <a:spcAft>
+                <a:spcPct val="0"/>
+              </a:spcAft>
+              <a:buClrTx/>
+              <a:buSzTx/>
+              <a:buFontTx/>
+              <a:buNone/>
+              <a:tabLst/>
+            </a:pPr>
+            <a:r>
+              <a:rPr kumimoji="0" lang="fr-FR" altLang="fr-FR" sz="4800" b="0" i="0" u="none" strike="noStrike" cap="none" normalizeH="0" baseline="0" noProof="1">
+                <a:ln>
+                  <a:noFill/>
+                </a:ln>
+                <a:solidFill>
+                  <a:schemeClr val="tx1"/>
+                </a:solidFill>
+                <a:effectLst/>
+                <a:latin typeface="Consolas" panose="020B0609020204030204" pitchFamily="49" charset="0"/>
+              </a:rPr>
+              <a:t>Serial.println(gps.date.day()); // Day (1-31) (u8)</a:t>
+            </a:r>
+          </a:p>
+          <a:p>
+            <a:pPr marL="0" marR="0" lvl="0" indent="0" algn="l" defTabSz="914400" rtl="0" eaLnBrk="0" fontAlgn="base" latinLnBrk="0" hangingPunct="0">
+              <a:lnSpc>
+                <a:spcPct val="100000"/>
+              </a:lnSpc>
+              <a:spcBef>
+                <a:spcPct val="0"/>
+              </a:spcBef>
+              <a:spcAft>
+                <a:spcPct val="0"/>
+              </a:spcAft>
+              <a:buClrTx/>
+              <a:buSzTx/>
+              <a:buFontTx/>
+              <a:buNone/>
+              <a:tabLst/>
+            </a:pPr>
+            <a:r>
+              <a:rPr kumimoji="0" lang="fr-FR" altLang="fr-FR" sz="4800" b="0" i="0" u="none" strike="noStrike" cap="none" normalizeH="0" baseline="0" noProof="1">
+                <a:ln>
+                  <a:noFill/>
+                </a:ln>
+                <a:solidFill>
+                  <a:schemeClr val="tx1"/>
+                </a:solidFill>
+                <a:effectLst/>
+                <a:latin typeface="Consolas" panose="020B0609020204030204" pitchFamily="49" charset="0"/>
+              </a:rPr>
+              <a:t>Serial.println(gps.time.value()); // Raw time in HHMMSSCC format (u32)</a:t>
+            </a:r>
+          </a:p>
+          <a:p>
+            <a:pPr marL="0" marR="0" lvl="0" indent="0" algn="l" defTabSz="914400" rtl="0" eaLnBrk="0" fontAlgn="base" latinLnBrk="0" hangingPunct="0">
+              <a:lnSpc>
+                <a:spcPct val="100000"/>
+              </a:lnSpc>
+              <a:spcBef>
+                <a:spcPct val="0"/>
+              </a:spcBef>
+              <a:spcAft>
+                <a:spcPct val="0"/>
+              </a:spcAft>
+              <a:buClrTx/>
+              <a:buSzTx/>
+              <a:buFontTx/>
+              <a:buNone/>
+              <a:tabLst/>
+            </a:pPr>
+            <a:r>
+              <a:rPr kumimoji="0" lang="fr-FR" altLang="fr-FR" sz="4800" b="0" i="0" u="none" strike="noStrike" cap="none" normalizeH="0" baseline="0" noProof="1">
+                <a:ln>
+                  <a:noFill/>
+                </a:ln>
+                <a:solidFill>
+                  <a:schemeClr val="tx1"/>
+                </a:solidFill>
+                <a:effectLst/>
+                <a:latin typeface="Consolas" panose="020B0609020204030204" pitchFamily="49" charset="0"/>
+              </a:rPr>
+              <a:t>Serial.println(gps.time.hour()); // Hour (0-23) (u8)</a:t>
+            </a:r>
+          </a:p>
+          <a:p>
+            <a:pPr marL="0" marR="0" lvl="0" indent="0" algn="l" defTabSz="914400" rtl="0" eaLnBrk="0" fontAlgn="base" latinLnBrk="0" hangingPunct="0">
+              <a:lnSpc>
+                <a:spcPct val="100000"/>
+              </a:lnSpc>
+              <a:spcBef>
+                <a:spcPct val="0"/>
+              </a:spcBef>
+              <a:spcAft>
+                <a:spcPct val="0"/>
+              </a:spcAft>
+              <a:buClrTx/>
+              <a:buSzTx/>
+              <a:buFontTx/>
+              <a:buNone/>
+              <a:tabLst/>
+            </a:pPr>
+            <a:r>
+              <a:rPr kumimoji="0" lang="fr-FR" altLang="fr-FR" sz="4800" b="0" i="0" u="none" strike="noStrike" cap="none" normalizeH="0" baseline="0" noProof="1">
+                <a:ln>
+                  <a:noFill/>
+                </a:ln>
+                <a:solidFill>
+                  <a:schemeClr val="tx1"/>
+                </a:solidFill>
+                <a:effectLst/>
+                <a:latin typeface="Consolas" panose="020B0609020204030204" pitchFamily="49" charset="0"/>
+              </a:rPr>
+              <a:t>Serial.println(gps.time.minute()); // Minute (0-59) (u8)</a:t>
+            </a:r>
+          </a:p>
+          <a:p>
+            <a:pPr marL="0" marR="0" lvl="0" indent="0" algn="l" defTabSz="914400" rtl="0" eaLnBrk="0" fontAlgn="base" latinLnBrk="0" hangingPunct="0">
+              <a:lnSpc>
+                <a:spcPct val="100000"/>
+              </a:lnSpc>
+              <a:spcBef>
+                <a:spcPct val="0"/>
+              </a:spcBef>
+              <a:spcAft>
+                <a:spcPct val="0"/>
+              </a:spcAft>
+              <a:buClrTx/>
+              <a:buSzTx/>
+              <a:buFontTx/>
+              <a:buNone/>
+              <a:tabLst/>
+            </a:pPr>
+            <a:r>
+              <a:rPr kumimoji="0" lang="fr-FR" altLang="fr-FR" sz="4800" b="0" i="0" u="none" strike="noStrike" cap="none" normalizeH="0" baseline="0" noProof="1">
+                <a:ln>
+                  <a:noFill/>
+                </a:ln>
+                <a:solidFill>
+                  <a:schemeClr val="tx1"/>
+                </a:solidFill>
+                <a:effectLst/>
+                <a:latin typeface="Consolas" panose="020B0609020204030204" pitchFamily="49" charset="0"/>
+              </a:rPr>
+              <a:t>Serial.println(gps.time.second()); // Second (0-59) (u8)</a:t>
+            </a:r>
+          </a:p>
+          <a:p>
+            <a:pPr marL="0" marR="0" lvl="0" indent="0" algn="l" defTabSz="914400" rtl="0" eaLnBrk="0" fontAlgn="base" latinLnBrk="0" hangingPunct="0">
+              <a:lnSpc>
+                <a:spcPct val="100000"/>
+              </a:lnSpc>
+              <a:spcBef>
+                <a:spcPct val="0"/>
+              </a:spcBef>
+              <a:spcAft>
+                <a:spcPct val="0"/>
+              </a:spcAft>
+              <a:buClrTx/>
+              <a:buSzTx/>
+              <a:buFontTx/>
+              <a:buNone/>
+              <a:tabLst/>
+            </a:pPr>
+            <a:r>
+              <a:rPr kumimoji="0" lang="fr-FR" altLang="fr-FR" sz="4800" b="0" i="0" u="none" strike="noStrike" cap="none" normalizeH="0" baseline="0" noProof="1">
+                <a:ln>
+                  <a:noFill/>
+                </a:ln>
+                <a:solidFill>
+                  <a:schemeClr val="tx1"/>
+                </a:solidFill>
+                <a:effectLst/>
+                <a:latin typeface="Consolas" panose="020B0609020204030204" pitchFamily="49" charset="0"/>
+              </a:rPr>
+              <a:t>Serial.println(gps.time.centisecond()); // 100ths of a second (0-99) (u8)</a:t>
+            </a:r>
+          </a:p>
+          <a:p>
+            <a:pPr marL="0" marR="0" lvl="0" indent="0" algn="l" defTabSz="914400" rtl="0" eaLnBrk="0" fontAlgn="base" latinLnBrk="0" hangingPunct="0">
+              <a:lnSpc>
+                <a:spcPct val="100000"/>
+              </a:lnSpc>
+              <a:spcBef>
+                <a:spcPct val="0"/>
+              </a:spcBef>
+              <a:spcAft>
+                <a:spcPct val="0"/>
+              </a:spcAft>
+              <a:buClrTx/>
+              <a:buSzTx/>
+              <a:buFontTx/>
+              <a:buNone/>
+              <a:tabLst/>
+            </a:pPr>
+            <a:r>
+              <a:rPr kumimoji="0" lang="fr-FR" altLang="fr-FR" sz="4800" b="0" i="0" u="none" strike="noStrike" cap="none" normalizeH="0" baseline="0" noProof="1">
+                <a:ln>
+                  <a:noFill/>
+                </a:ln>
+                <a:solidFill>
+                  <a:schemeClr val="tx1"/>
+                </a:solidFill>
+                <a:effectLst/>
+                <a:latin typeface="Consolas" panose="020B0609020204030204" pitchFamily="49" charset="0"/>
+              </a:rPr>
+              <a:t>Serial.println(gps.speed.value()); // Raw speed in 100ths of a knot (i32)</a:t>
+            </a:r>
+          </a:p>
+          <a:p>
+            <a:pPr marL="0" marR="0" lvl="0" indent="0" algn="l" defTabSz="914400" rtl="0" eaLnBrk="0" fontAlgn="base" latinLnBrk="0" hangingPunct="0">
+              <a:lnSpc>
+                <a:spcPct val="100000"/>
+              </a:lnSpc>
+              <a:spcBef>
+                <a:spcPct val="0"/>
+              </a:spcBef>
+              <a:spcAft>
+                <a:spcPct val="0"/>
+              </a:spcAft>
+              <a:buClrTx/>
+              <a:buSzTx/>
+              <a:buFontTx/>
+              <a:buNone/>
+              <a:tabLst/>
+            </a:pPr>
+            <a:r>
+              <a:rPr kumimoji="0" lang="fr-FR" altLang="fr-FR" sz="4800" b="0" i="0" u="none" strike="noStrike" cap="none" normalizeH="0" baseline="0" noProof="1">
+                <a:ln>
+                  <a:noFill/>
+                </a:ln>
+                <a:solidFill>
+                  <a:schemeClr val="tx1"/>
+                </a:solidFill>
+                <a:effectLst/>
+                <a:latin typeface="Consolas" panose="020B0609020204030204" pitchFamily="49" charset="0"/>
+              </a:rPr>
+              <a:t>Serial.println(gps.speed.knots()); // Speed in knots (double)</a:t>
+            </a:r>
+          </a:p>
+          <a:p>
+            <a:pPr marL="0" marR="0" lvl="0" indent="0" algn="l" defTabSz="914400" rtl="0" eaLnBrk="0" fontAlgn="base" latinLnBrk="0" hangingPunct="0">
+              <a:lnSpc>
+                <a:spcPct val="100000"/>
+              </a:lnSpc>
+              <a:spcBef>
+                <a:spcPct val="0"/>
+              </a:spcBef>
+              <a:spcAft>
+                <a:spcPct val="0"/>
+              </a:spcAft>
+              <a:buClrTx/>
+              <a:buSzTx/>
+              <a:buFontTx/>
+              <a:buNone/>
+              <a:tabLst/>
+            </a:pPr>
+            <a:r>
+              <a:rPr kumimoji="0" lang="fr-FR" altLang="fr-FR" sz="4800" b="0" i="0" u="none" strike="noStrike" cap="none" normalizeH="0" baseline="0" noProof="1">
+                <a:ln>
+                  <a:noFill/>
+                </a:ln>
+                <a:solidFill>
+                  <a:schemeClr val="tx1"/>
+                </a:solidFill>
+                <a:effectLst/>
+                <a:latin typeface="Consolas" panose="020B0609020204030204" pitchFamily="49" charset="0"/>
+              </a:rPr>
+              <a:t>Serial.println(gps.speed.mph()); // Speed in miles per hour (double)</a:t>
+            </a:r>
+          </a:p>
+          <a:p>
+            <a:pPr marL="0" marR="0" lvl="0" indent="0" algn="l" defTabSz="914400" rtl="0" eaLnBrk="0" fontAlgn="base" latinLnBrk="0" hangingPunct="0">
+              <a:lnSpc>
+                <a:spcPct val="100000"/>
+              </a:lnSpc>
+              <a:spcBef>
+                <a:spcPct val="0"/>
+              </a:spcBef>
+              <a:spcAft>
+                <a:spcPct val="0"/>
+              </a:spcAft>
+              <a:buClrTx/>
+              <a:buSzTx/>
+              <a:buFontTx/>
+              <a:buNone/>
+              <a:tabLst/>
+            </a:pPr>
+            <a:r>
+              <a:rPr kumimoji="0" lang="fr-FR" altLang="fr-FR" sz="4800" b="0" i="0" u="none" strike="noStrike" cap="none" normalizeH="0" baseline="0" noProof="1">
+                <a:ln>
+                  <a:noFill/>
+                </a:ln>
+                <a:solidFill>
+                  <a:schemeClr val="tx1"/>
+                </a:solidFill>
+                <a:effectLst/>
+                <a:latin typeface="Consolas" panose="020B0609020204030204" pitchFamily="49" charset="0"/>
+              </a:rPr>
+              <a:t>Serial.println(gps.speed.mps()); // Speed in meters per second (double)</a:t>
+            </a:r>
+          </a:p>
+          <a:p>
+            <a:pPr marL="0" marR="0" lvl="0" indent="0" algn="l" defTabSz="914400" rtl="0" eaLnBrk="0" fontAlgn="base" latinLnBrk="0" hangingPunct="0">
+              <a:lnSpc>
+                <a:spcPct val="100000"/>
+              </a:lnSpc>
+              <a:spcBef>
+                <a:spcPct val="0"/>
+              </a:spcBef>
+              <a:spcAft>
+                <a:spcPct val="0"/>
+              </a:spcAft>
+              <a:buClrTx/>
+              <a:buSzTx/>
+              <a:buFontTx/>
+              <a:buNone/>
+              <a:tabLst/>
+            </a:pPr>
+            <a:r>
+              <a:rPr kumimoji="0" lang="fr-FR" altLang="fr-FR" sz="4800" b="0" i="0" u="none" strike="noStrike" cap="none" normalizeH="0" baseline="0" noProof="1">
+                <a:ln>
+                  <a:noFill/>
+                </a:ln>
+                <a:solidFill>
+                  <a:schemeClr val="tx1"/>
+                </a:solidFill>
+                <a:effectLst/>
+                <a:latin typeface="Consolas" panose="020B0609020204030204" pitchFamily="49" charset="0"/>
+              </a:rPr>
+              <a:t>Serial.println(gps.speed.kmph()); // Speed in kilometers per hour (double)</a:t>
+            </a:r>
+          </a:p>
+          <a:p>
+            <a:pPr marL="0" marR="0" lvl="0" indent="0" algn="l" defTabSz="914400" rtl="0" eaLnBrk="0" fontAlgn="base" latinLnBrk="0" hangingPunct="0">
+              <a:lnSpc>
+                <a:spcPct val="100000"/>
+              </a:lnSpc>
+              <a:spcBef>
+                <a:spcPct val="0"/>
+              </a:spcBef>
+              <a:spcAft>
+                <a:spcPct val="0"/>
+              </a:spcAft>
+              <a:buClrTx/>
+              <a:buSzTx/>
+              <a:buFontTx/>
+              <a:buNone/>
+              <a:tabLst/>
+            </a:pPr>
+            <a:r>
+              <a:rPr kumimoji="0" lang="fr-FR" altLang="fr-FR" sz="4800" b="0" i="0" u="none" strike="noStrike" cap="none" normalizeH="0" baseline="0" noProof="1">
+                <a:ln>
+                  <a:noFill/>
+                </a:ln>
+                <a:solidFill>
+                  <a:schemeClr val="tx1"/>
+                </a:solidFill>
+                <a:effectLst/>
+                <a:latin typeface="Consolas" panose="020B0609020204030204" pitchFamily="49" charset="0"/>
+              </a:rPr>
+              <a:t>Serial.println(gps.course.value()); // Raw course in 100ths of a degree (i32)</a:t>
+            </a:r>
+          </a:p>
+          <a:p>
+            <a:pPr marL="0" marR="0" lvl="0" indent="0" algn="l" defTabSz="914400" rtl="0" eaLnBrk="0" fontAlgn="base" latinLnBrk="0" hangingPunct="0">
+              <a:lnSpc>
+                <a:spcPct val="100000"/>
+              </a:lnSpc>
+              <a:spcBef>
+                <a:spcPct val="0"/>
+              </a:spcBef>
+              <a:spcAft>
+                <a:spcPct val="0"/>
+              </a:spcAft>
+              <a:buClrTx/>
+              <a:buSzTx/>
+              <a:buFontTx/>
+              <a:buNone/>
+              <a:tabLst/>
+            </a:pPr>
+            <a:r>
+              <a:rPr kumimoji="0" lang="fr-FR" altLang="fr-FR" sz="4800" b="0" i="0" u="none" strike="noStrike" cap="none" normalizeH="0" baseline="0" noProof="1">
+                <a:ln>
+                  <a:noFill/>
+                </a:ln>
+                <a:solidFill>
+                  <a:schemeClr val="tx1"/>
+                </a:solidFill>
+                <a:effectLst/>
+                <a:latin typeface="Consolas" panose="020B0609020204030204" pitchFamily="49" charset="0"/>
+              </a:rPr>
+              <a:t>Serial.println(gps.course.deg()); // Course in degrees (double)</a:t>
+            </a:r>
+          </a:p>
+          <a:p>
+            <a:pPr marL="0" marR="0" lvl="0" indent="0" algn="l" defTabSz="914400" rtl="0" eaLnBrk="0" fontAlgn="base" latinLnBrk="0" hangingPunct="0">
+              <a:lnSpc>
+                <a:spcPct val="100000"/>
+              </a:lnSpc>
+              <a:spcBef>
+                <a:spcPct val="0"/>
+              </a:spcBef>
+              <a:spcAft>
+                <a:spcPct val="0"/>
+              </a:spcAft>
+              <a:buClrTx/>
+              <a:buSzTx/>
+              <a:buFontTx/>
+              <a:buNone/>
+              <a:tabLst/>
+            </a:pPr>
+            <a:r>
+              <a:rPr kumimoji="0" lang="fr-FR" altLang="fr-FR" sz="4800" b="0" i="0" u="none" strike="noStrike" cap="none" normalizeH="0" baseline="0" noProof="1">
+                <a:ln>
+                  <a:noFill/>
+                </a:ln>
+                <a:solidFill>
+                  <a:schemeClr val="tx1"/>
+                </a:solidFill>
+                <a:effectLst/>
+                <a:latin typeface="Consolas" panose="020B0609020204030204" pitchFamily="49" charset="0"/>
+              </a:rPr>
+              <a:t>Serial.println(gps.altitude.value()); // Raw altitude in centimeters (i32)</a:t>
+            </a:r>
+          </a:p>
+          <a:p>
+            <a:pPr marL="0" marR="0" lvl="0" indent="0" algn="l" defTabSz="914400" rtl="0" eaLnBrk="0" fontAlgn="base" latinLnBrk="0" hangingPunct="0">
+              <a:lnSpc>
+                <a:spcPct val="100000"/>
+              </a:lnSpc>
+              <a:spcBef>
+                <a:spcPct val="0"/>
+              </a:spcBef>
+              <a:spcAft>
+                <a:spcPct val="0"/>
+              </a:spcAft>
+              <a:buClrTx/>
+              <a:buSzTx/>
+              <a:buFontTx/>
+              <a:buNone/>
+              <a:tabLst/>
+            </a:pPr>
+            <a:r>
+              <a:rPr kumimoji="0" lang="fr-FR" altLang="fr-FR" sz="4800" b="0" i="0" u="none" strike="noStrike" cap="none" normalizeH="0" baseline="0" noProof="1">
+                <a:ln>
+                  <a:noFill/>
+                </a:ln>
+                <a:solidFill>
+                  <a:schemeClr val="tx1"/>
+                </a:solidFill>
+                <a:effectLst/>
+                <a:latin typeface="Consolas" panose="020B0609020204030204" pitchFamily="49" charset="0"/>
+              </a:rPr>
+              <a:t>Serial.println(gps.altitude.meters()); // Altitude in meters (double)</a:t>
+            </a:r>
+          </a:p>
+          <a:p>
+            <a:pPr marL="0" marR="0" lvl="0" indent="0" algn="l" defTabSz="914400" rtl="0" eaLnBrk="0" fontAlgn="base" latinLnBrk="0" hangingPunct="0">
+              <a:lnSpc>
+                <a:spcPct val="100000"/>
+              </a:lnSpc>
+              <a:spcBef>
+                <a:spcPct val="0"/>
+              </a:spcBef>
+              <a:spcAft>
+                <a:spcPct val="0"/>
+              </a:spcAft>
+              <a:buClrTx/>
+              <a:buSzTx/>
+              <a:buFontTx/>
+              <a:buNone/>
+              <a:tabLst/>
+            </a:pPr>
+            <a:r>
+              <a:rPr kumimoji="0" lang="fr-FR" altLang="fr-FR" sz="4800" b="0" i="0" u="none" strike="noStrike" cap="none" normalizeH="0" baseline="0" noProof="1">
+                <a:ln>
+                  <a:noFill/>
+                </a:ln>
+                <a:solidFill>
+                  <a:schemeClr val="tx1"/>
+                </a:solidFill>
+                <a:effectLst/>
+                <a:latin typeface="Consolas" panose="020B0609020204030204" pitchFamily="49" charset="0"/>
+              </a:rPr>
+              <a:t>Serial.println(gps.altitude.miles()); // Altitude in miles (double)</a:t>
+            </a:r>
+          </a:p>
+          <a:p>
+            <a:pPr marL="0" marR="0" lvl="0" indent="0" algn="l" defTabSz="914400" rtl="0" eaLnBrk="0" fontAlgn="base" latinLnBrk="0" hangingPunct="0">
+              <a:lnSpc>
+                <a:spcPct val="100000"/>
+              </a:lnSpc>
+              <a:spcBef>
+                <a:spcPct val="0"/>
+              </a:spcBef>
+              <a:spcAft>
+                <a:spcPct val="0"/>
+              </a:spcAft>
+              <a:buClrTx/>
+              <a:buSzTx/>
+              <a:buFontTx/>
+              <a:buNone/>
+              <a:tabLst/>
+            </a:pPr>
+            <a:r>
+              <a:rPr kumimoji="0" lang="fr-FR" altLang="fr-FR" sz="4800" b="0" i="0" u="none" strike="noStrike" cap="none" normalizeH="0" baseline="0" noProof="1">
+                <a:ln>
+                  <a:noFill/>
+                </a:ln>
+                <a:solidFill>
+                  <a:schemeClr val="tx1"/>
+                </a:solidFill>
+                <a:effectLst/>
+                <a:latin typeface="Consolas" panose="020B0609020204030204" pitchFamily="49" charset="0"/>
+              </a:rPr>
+              <a:t>Serial.println(gps.altitude.kilometers()); // Altitude in kilometers (double)</a:t>
+            </a:r>
+          </a:p>
+          <a:p>
+            <a:pPr marL="0" marR="0" lvl="0" indent="0" algn="l" defTabSz="914400" rtl="0" eaLnBrk="0" fontAlgn="base" latinLnBrk="0" hangingPunct="0">
+              <a:lnSpc>
+                <a:spcPct val="100000"/>
+              </a:lnSpc>
+              <a:spcBef>
+                <a:spcPct val="0"/>
+              </a:spcBef>
+              <a:spcAft>
+                <a:spcPct val="0"/>
+              </a:spcAft>
+              <a:buClrTx/>
+              <a:buSzTx/>
+              <a:buFontTx/>
+              <a:buNone/>
+              <a:tabLst/>
+            </a:pPr>
+            <a:r>
+              <a:rPr kumimoji="0" lang="fr-FR" altLang="fr-FR" sz="4800" b="0" i="0" u="none" strike="noStrike" cap="none" normalizeH="0" baseline="0" noProof="1">
+                <a:ln>
+                  <a:noFill/>
+                </a:ln>
+                <a:solidFill>
+                  <a:schemeClr val="tx1"/>
+                </a:solidFill>
+                <a:effectLst/>
+                <a:latin typeface="Consolas" panose="020B0609020204030204" pitchFamily="49" charset="0"/>
+              </a:rPr>
+              <a:t>Serial.println(gps.altitude.feet()); // Altitude in feet (double)</a:t>
+            </a:r>
+          </a:p>
+          <a:p>
+            <a:pPr marL="0" marR="0" lvl="0" indent="0" algn="l" defTabSz="914400" rtl="0" eaLnBrk="0" fontAlgn="base" latinLnBrk="0" hangingPunct="0">
+              <a:lnSpc>
+                <a:spcPct val="100000"/>
+              </a:lnSpc>
+              <a:spcBef>
+                <a:spcPct val="0"/>
+              </a:spcBef>
+              <a:spcAft>
+                <a:spcPct val="0"/>
+              </a:spcAft>
+              <a:buClrTx/>
+              <a:buSzTx/>
+              <a:buFontTx/>
+              <a:buNone/>
+              <a:tabLst/>
+            </a:pPr>
+            <a:r>
+              <a:rPr kumimoji="0" lang="fr-FR" altLang="fr-FR" sz="4800" b="0" i="0" u="none" strike="noStrike" cap="none" normalizeH="0" baseline="0" noProof="1">
+                <a:ln>
+                  <a:noFill/>
+                </a:ln>
+                <a:solidFill>
+                  <a:schemeClr val="tx1"/>
+                </a:solidFill>
+                <a:effectLst/>
+                <a:latin typeface="Consolas" panose="020B0609020204030204" pitchFamily="49" charset="0"/>
+              </a:rPr>
+              <a:t>Serial.println(gps.satellites.value()); // Number of satellites in use (u32)</a:t>
+            </a:r>
+          </a:p>
+          <a:p>
+            <a:pPr marL="0" marR="0" lvl="0" indent="0" algn="l" defTabSz="914400" rtl="0" eaLnBrk="0" fontAlgn="base" latinLnBrk="0" hangingPunct="0">
+              <a:lnSpc>
+                <a:spcPct val="100000"/>
+              </a:lnSpc>
+              <a:spcBef>
+                <a:spcPct val="0"/>
+              </a:spcBef>
+              <a:spcAft>
+                <a:spcPct val="0"/>
+              </a:spcAft>
+              <a:buClrTx/>
+              <a:buSzTx/>
+              <a:buFontTx/>
+              <a:buNone/>
+              <a:tabLst/>
+            </a:pPr>
+            <a:r>
+              <a:rPr kumimoji="0" lang="fr-FR" altLang="fr-FR" sz="4800" b="0" i="0" u="none" strike="noStrike" cap="none" normalizeH="0" baseline="0" noProof="1">
+                <a:ln>
+                  <a:noFill/>
+                </a:ln>
+                <a:solidFill>
+                  <a:schemeClr val="tx1"/>
+                </a:solidFill>
+                <a:effectLst/>
+                <a:latin typeface="Consolas" panose="020B0609020204030204" pitchFamily="49" charset="0"/>
+              </a:rPr>
+              <a:t>Serial.println(gps.hdop.value()); // Horizontal Dim. of Precision (100ths-i32)</a:t>
+            </a:r>
+          </a:p>
+          <a:p>
+            <a:endParaRPr lang="fr-FR" noProof="1"/>
           </a:p>
         </p:txBody>
       </p:sp>
     </p:spTree>
     <p:extLst>
       <p:ext uri="{BB962C8B-B14F-4D97-AF65-F5344CB8AC3E}">
-        <p14:creationId xmlns:p14="http://schemas.microsoft.com/office/powerpoint/2010/main" val="1917717794"/>
+        <p14:creationId xmlns:p14="http://schemas.microsoft.com/office/powerpoint/2010/main" val="3313896012"/>
       </p:ext>
     </p:extLst>
   </p:cSld>

</xml_diff>

<commit_message>
Mise à jour 14/02/23
On a écrit des trucs
</commit_message>
<xml_diff>
--- a/Notes.pptx
+++ b/Notes.pptx
@@ -17,6 +17,7 @@
     <p:sldId id="264" r:id="rId11"/>
     <p:sldId id="267" r:id="rId12"/>
     <p:sldId id="268" r:id="rId13"/>
+    <p:sldId id="269" r:id="rId14"/>
   </p:sldIdLst>
   <p:sldSz cx="12192000" cy="6858000"/>
   <p:notesSz cx="6858000" cy="9144000"/>
@@ -270,7 +271,7 @@
           <a:p>
             <a:fld id="{BD1CE7B9-D124-4FB5-A5FC-D30B36F1B510}" type="datetimeFigureOut">
               <a:rPr lang="fr-FR" smtClean="0"/>
-              <a:t>11/02/2023</a:t>
+              <a:t>14/02/2023</a:t>
             </a:fld>
             <a:endParaRPr lang="fr-FR"/>
           </a:p>
@@ -468,7 +469,7 @@
           <a:p>
             <a:fld id="{BD1CE7B9-D124-4FB5-A5FC-D30B36F1B510}" type="datetimeFigureOut">
               <a:rPr lang="fr-FR" smtClean="0"/>
-              <a:t>11/02/2023</a:t>
+              <a:t>14/02/2023</a:t>
             </a:fld>
             <a:endParaRPr lang="fr-FR"/>
           </a:p>
@@ -676,7 +677,7 @@
           <a:p>
             <a:fld id="{BD1CE7B9-D124-4FB5-A5FC-D30B36F1B510}" type="datetimeFigureOut">
               <a:rPr lang="fr-FR" smtClean="0"/>
-              <a:t>11/02/2023</a:t>
+              <a:t>14/02/2023</a:t>
             </a:fld>
             <a:endParaRPr lang="fr-FR"/>
           </a:p>
@@ -874,7 +875,7 @@
           <a:p>
             <a:fld id="{BD1CE7B9-D124-4FB5-A5FC-D30B36F1B510}" type="datetimeFigureOut">
               <a:rPr lang="fr-FR" smtClean="0"/>
-              <a:t>11/02/2023</a:t>
+              <a:t>14/02/2023</a:t>
             </a:fld>
             <a:endParaRPr lang="fr-FR"/>
           </a:p>
@@ -1149,7 +1150,7 @@
           <a:p>
             <a:fld id="{BD1CE7B9-D124-4FB5-A5FC-D30B36F1B510}" type="datetimeFigureOut">
               <a:rPr lang="fr-FR" smtClean="0"/>
-              <a:t>11/02/2023</a:t>
+              <a:t>14/02/2023</a:t>
             </a:fld>
             <a:endParaRPr lang="fr-FR"/>
           </a:p>
@@ -1414,7 +1415,7 @@
           <a:p>
             <a:fld id="{BD1CE7B9-D124-4FB5-A5FC-D30B36F1B510}" type="datetimeFigureOut">
               <a:rPr lang="fr-FR" smtClean="0"/>
-              <a:t>11/02/2023</a:t>
+              <a:t>14/02/2023</a:t>
             </a:fld>
             <a:endParaRPr lang="fr-FR"/>
           </a:p>
@@ -1826,7 +1827,7 @@
           <a:p>
             <a:fld id="{BD1CE7B9-D124-4FB5-A5FC-D30B36F1B510}" type="datetimeFigureOut">
               <a:rPr lang="fr-FR" smtClean="0"/>
-              <a:t>11/02/2023</a:t>
+              <a:t>14/02/2023</a:t>
             </a:fld>
             <a:endParaRPr lang="fr-FR"/>
           </a:p>
@@ -1967,7 +1968,7 @@
           <a:p>
             <a:fld id="{BD1CE7B9-D124-4FB5-A5FC-D30B36F1B510}" type="datetimeFigureOut">
               <a:rPr lang="fr-FR" smtClean="0"/>
-              <a:t>11/02/2023</a:t>
+              <a:t>14/02/2023</a:t>
             </a:fld>
             <a:endParaRPr lang="fr-FR"/>
           </a:p>
@@ -2080,7 +2081,7 @@
           <a:p>
             <a:fld id="{BD1CE7B9-D124-4FB5-A5FC-D30B36F1B510}" type="datetimeFigureOut">
               <a:rPr lang="fr-FR" smtClean="0"/>
-              <a:t>11/02/2023</a:t>
+              <a:t>14/02/2023</a:t>
             </a:fld>
             <a:endParaRPr lang="fr-FR"/>
           </a:p>
@@ -2391,7 +2392,7 @@
           <a:p>
             <a:fld id="{BD1CE7B9-D124-4FB5-A5FC-D30B36F1B510}" type="datetimeFigureOut">
               <a:rPr lang="fr-FR" smtClean="0"/>
-              <a:t>11/02/2023</a:t>
+              <a:t>14/02/2023</a:t>
             </a:fld>
             <a:endParaRPr lang="fr-FR"/>
           </a:p>
@@ -2679,7 +2680,7 @@
           <a:p>
             <a:fld id="{BD1CE7B9-D124-4FB5-A5FC-D30B36F1B510}" type="datetimeFigureOut">
               <a:rPr lang="fr-FR" smtClean="0"/>
-              <a:t>11/02/2023</a:t>
+              <a:t>14/02/2023</a:t>
             </a:fld>
             <a:endParaRPr lang="fr-FR"/>
           </a:p>
@@ -2920,7 +2921,7 @@
           <a:p>
             <a:fld id="{BD1CE7B9-D124-4FB5-A5FC-D30B36F1B510}" type="datetimeFigureOut">
               <a:rPr lang="fr-FR" smtClean="0"/>
-              <a:t>11/02/2023</a:t>
+              <a:t>14/02/2023</a:t>
             </a:fld>
             <a:endParaRPr lang="fr-FR"/>
           </a:p>
@@ -3768,6 +3769,97 @@
 </p:sld>
 </file>
 
+<file path=ppt/slides/slide13.xml><?xml version="1.0" encoding="utf-8"?>
+<p:sld xmlns:a="http://schemas.openxmlformats.org/drawingml/2006/main" xmlns:r="http://schemas.openxmlformats.org/officeDocument/2006/relationships" xmlns:p="http://schemas.openxmlformats.org/presentationml/2006/main">
+  <p:cSld>
+    <p:spTree>
+      <p:nvGrpSpPr>
+        <p:cNvPr id="1" name=""/>
+        <p:cNvGrpSpPr/>
+        <p:nvPr/>
+      </p:nvGrpSpPr>
+      <p:grpSpPr>
+        <a:xfrm>
+          <a:off x="0" y="0"/>
+          <a:ext cx="0" cy="0"/>
+          <a:chOff x="0" y="0"/>
+          <a:chExt cx="0" cy="0"/>
+        </a:xfrm>
+      </p:grpSpPr>
+      <p:sp>
+        <p:nvSpPr>
+          <p:cNvPr id="2" name="Titre 1">
+            <a:extLst>
+              <a:ext uri="{FF2B5EF4-FFF2-40B4-BE49-F238E27FC236}">
+                <a16:creationId xmlns:a16="http://schemas.microsoft.com/office/drawing/2014/main" id="{06181BBF-2D5A-D42E-F190-73F6D74D5E9B}"/>
+              </a:ext>
+            </a:extLst>
+          </p:cNvPr>
+          <p:cNvSpPr>
+            <a:spLocks noGrp="1"/>
+          </p:cNvSpPr>
+          <p:nvPr>
+            <p:ph type="title"/>
+          </p:nvPr>
+        </p:nvSpPr>
+        <p:spPr/>
+        <p:txBody>
+          <a:bodyPr/>
+          <a:lstStyle/>
+          <a:p>
+            <a:r>
+              <a:rPr lang="fr-BE" dirty="0"/>
+              <a:t>Serveur Web + lien Google </a:t>
+            </a:r>
+            <a:r>
+              <a:rPr lang="fr-BE" dirty="0" err="1"/>
+              <a:t>Maps</a:t>
+            </a:r>
+            <a:endParaRPr lang="fr-BE" dirty="0"/>
+          </a:p>
+        </p:txBody>
+      </p:sp>
+      <p:sp>
+        <p:nvSpPr>
+          <p:cNvPr id="3" name="Espace réservé du contenu 2">
+            <a:extLst>
+              <a:ext uri="{FF2B5EF4-FFF2-40B4-BE49-F238E27FC236}">
+                <a16:creationId xmlns:a16="http://schemas.microsoft.com/office/drawing/2014/main" id="{F75AC1C8-359E-B863-2D49-0A8581A9F665}"/>
+              </a:ext>
+            </a:extLst>
+          </p:cNvPr>
+          <p:cNvSpPr>
+            <a:spLocks noGrp="1"/>
+          </p:cNvSpPr>
+          <p:nvPr>
+            <p:ph idx="1"/>
+          </p:nvPr>
+        </p:nvSpPr>
+        <p:spPr/>
+        <p:txBody>
+          <a:bodyPr/>
+          <a:lstStyle/>
+          <a:p>
+            <a:r>
+              <a:rPr lang="fr-BE" dirty="0"/>
+              <a:t>https://microcontrollerslab.com/neo-6m-gps-module-esp8266-nodemcu-track-location-google-maps/</a:t>
+            </a:r>
+          </a:p>
+        </p:txBody>
+      </p:sp>
+    </p:spTree>
+    <p:extLst>
+      <p:ext uri="{BB962C8B-B14F-4D97-AF65-F5344CB8AC3E}">
+        <p14:creationId xmlns:p14="http://schemas.microsoft.com/office/powerpoint/2010/main" val="1389756244"/>
+      </p:ext>
+    </p:extLst>
+  </p:cSld>
+  <p:clrMapOvr>
+    <a:masterClrMapping/>
+  </p:clrMapOvr>
+</p:sld>
+</file>
+
 <file path=ppt/slides/slide2.xml><?xml version="1.0" encoding="utf-8"?>
 <p:sld xmlns:a="http://schemas.openxmlformats.org/drawingml/2006/main" xmlns:r="http://schemas.openxmlformats.org/officeDocument/2006/relationships" xmlns:p="http://schemas.openxmlformats.org/presentationml/2006/main">
   <p:cSld>
@@ -3885,31 +3977,6 @@
       </p:grpSpPr>
       <p:sp>
         <p:nvSpPr>
-          <p:cNvPr id="2" name="Titre 1">
-            <a:extLst>
-              <a:ext uri="{FF2B5EF4-FFF2-40B4-BE49-F238E27FC236}">
-                <a16:creationId xmlns:a16="http://schemas.microsoft.com/office/drawing/2014/main" id="{226A9E48-8F04-0543-6B7A-DB8FBB34D8BC}"/>
-              </a:ext>
-            </a:extLst>
-          </p:cNvPr>
-          <p:cNvSpPr>
-            <a:spLocks noGrp="1"/>
-          </p:cNvSpPr>
-          <p:nvPr>
-            <p:ph type="title"/>
-          </p:nvPr>
-        </p:nvSpPr>
-        <p:spPr/>
-        <p:txBody>
-          <a:bodyPr/>
-          <a:lstStyle/>
-          <a:p>
-            <a:endParaRPr lang="fr-FR"/>
-          </a:p>
-        </p:txBody>
-      </p:sp>
-      <p:sp>
-        <p:nvSpPr>
           <p:cNvPr id="3" name="Espace réservé du contenu 2">
             <a:extLst>
               <a:ext uri="{FF2B5EF4-FFF2-40B4-BE49-F238E27FC236}">
@@ -3924,12 +3991,20 @@
             <p:ph idx="1"/>
           </p:nvPr>
         </p:nvSpPr>
-        <p:spPr/>
-        <p:txBody>
-          <a:bodyPr/>
-          <a:lstStyle/>
-          <a:p>
-            <a:endParaRPr lang="fr-FR"/>
+        <p:spPr>
+          <a:xfrm>
+            <a:off x="838200" y="5619412"/>
+            <a:ext cx="10515600" cy="713294"/>
+          </a:xfrm>
+        </p:spPr>
+        <p:txBody>
+          <a:bodyPr/>
+          <a:lstStyle/>
+          <a:p>
+            <a:r>
+              <a:rPr lang="fr-FR" dirty="0"/>
+              <a:t>https://randomnerdtutorials.com/esp8266-pinout-reference-gpios/</a:t>
+            </a:r>
           </a:p>
         </p:txBody>
       </p:sp>
@@ -3955,7 +4030,7 @@
         </p:blipFill>
         <p:spPr>
           <a:xfrm>
-            <a:off x="2205037" y="847725"/>
+            <a:off x="2205037" y="365125"/>
             <a:ext cx="7781925" cy="5162550"/>
           </a:xfrm>
           <a:prstGeom prst="rect">

</xml_diff>